<commit_message>
Final presentation cleanup and changes
</commit_message>
<xml_diff>
--- a/documents/presentation.pptx
+++ b/documents/presentation.pptx
@@ -6,20 +6,20 @@
   </p:sldMasterIdLst>
   <p:sldIdLst>
     <p:sldId id="256" r:id="rId2"/>
-    <p:sldId id="257" r:id="rId3"/>
-    <p:sldId id="259" r:id="rId4"/>
-    <p:sldId id="260" r:id="rId5"/>
-    <p:sldId id="261" r:id="rId6"/>
-    <p:sldId id="262" r:id="rId7"/>
+    <p:sldId id="262" r:id="rId3"/>
+    <p:sldId id="257" r:id="rId4"/>
+    <p:sldId id="259" r:id="rId5"/>
+    <p:sldId id="260" r:id="rId6"/>
+    <p:sldId id="261" r:id="rId7"/>
     <p:sldId id="263" r:id="rId8"/>
     <p:sldId id="264" r:id="rId9"/>
     <p:sldId id="265" r:id="rId10"/>
-    <p:sldId id="266" r:id="rId11"/>
-    <p:sldId id="267" r:id="rId12"/>
-    <p:sldId id="268" r:id="rId13"/>
-    <p:sldId id="270" r:id="rId14"/>
-    <p:sldId id="271" r:id="rId15"/>
-    <p:sldId id="272" r:id="rId16"/>
+    <p:sldId id="267" r:id="rId11"/>
+    <p:sldId id="268" r:id="rId12"/>
+    <p:sldId id="270" r:id="rId13"/>
+    <p:sldId id="271" r:id="rId14"/>
+    <p:sldId id="272" r:id="rId15"/>
+    <p:sldId id="266" r:id="rId16"/>
   </p:sldIdLst>
   <p:sldSz cx="12192000" cy="6858000"/>
   <p:notesSz cx="6858000" cy="9144000"/>
@@ -317,7 +317,7 @@
           <a:p>
             <a:fld id="{DA0DCAAE-88C2-4711-BA08-F240E32515AA}" type="datetimeFigureOut">
               <a:rPr lang="en-US" smtClean="0"/>
-              <a:t>12/5/2018</a:t>
+              <a:t>12/6/2018</a:t>
             </a:fld>
             <a:endParaRPr lang="en-US"/>
           </a:p>
@@ -753,7 +753,7 @@
           <a:p>
             <a:fld id="{DA0DCAAE-88C2-4711-BA08-F240E32515AA}" type="datetimeFigureOut">
               <a:rPr lang="en-US" smtClean="0"/>
-              <a:t>12/5/2018</a:t>
+              <a:t>12/6/2018</a:t>
             </a:fld>
             <a:endParaRPr lang="en-US"/>
           </a:p>
@@ -1003,7 +1003,7 @@
           <a:p>
             <a:fld id="{DA0DCAAE-88C2-4711-BA08-F240E32515AA}" type="datetimeFigureOut">
               <a:rPr lang="en-US" smtClean="0"/>
-              <a:t>12/5/2018</a:t>
+              <a:t>12/6/2018</a:t>
             </a:fld>
             <a:endParaRPr lang="en-US"/>
           </a:p>
@@ -1311,7 +1311,7 @@
           <a:p>
             <a:fld id="{DA0DCAAE-88C2-4711-BA08-F240E32515AA}" type="datetimeFigureOut">
               <a:rPr lang="en-US" smtClean="0"/>
-              <a:t>12/5/2018</a:t>
+              <a:t>12/6/2018</a:t>
             </a:fld>
             <a:endParaRPr lang="en-US"/>
           </a:p>
@@ -1629,7 +1629,7 @@
           <a:p>
             <a:fld id="{DA0DCAAE-88C2-4711-BA08-F240E32515AA}" type="datetimeFigureOut">
               <a:rPr lang="en-US" smtClean="0"/>
-              <a:t>12/5/2018</a:t>
+              <a:t>12/6/2018</a:t>
             </a:fld>
             <a:endParaRPr lang="en-US"/>
           </a:p>
@@ -1931,7 +1931,7 @@
           <a:p>
             <a:fld id="{DA0DCAAE-88C2-4711-BA08-F240E32515AA}" type="datetimeFigureOut">
               <a:rPr lang="en-US" smtClean="0"/>
-              <a:t>12/5/2018</a:t>
+              <a:t>12/6/2018</a:t>
             </a:fld>
             <a:endParaRPr lang="en-US"/>
           </a:p>
@@ -2298,7 +2298,7 @@
           <a:p>
             <a:fld id="{DA0DCAAE-88C2-4711-BA08-F240E32515AA}" type="datetimeFigureOut">
               <a:rPr lang="en-US" smtClean="0"/>
-              <a:t>12/5/2018</a:t>
+              <a:t>12/6/2018</a:t>
             </a:fld>
             <a:endParaRPr lang="en-US"/>
           </a:p>
@@ -2472,7 +2472,7 @@
           <a:p>
             <a:fld id="{DA0DCAAE-88C2-4711-BA08-F240E32515AA}" type="datetimeFigureOut">
               <a:rPr lang="en-US" smtClean="0"/>
-              <a:t>12/5/2018</a:t>
+              <a:t>12/6/2018</a:t>
             </a:fld>
             <a:endParaRPr lang="en-US"/>
           </a:p>
@@ -2652,7 +2652,7 @@
           <a:p>
             <a:fld id="{DA0DCAAE-88C2-4711-BA08-F240E32515AA}" type="datetimeFigureOut">
               <a:rPr lang="en-US" smtClean="0"/>
-              <a:t>12/5/2018</a:t>
+              <a:t>12/6/2018</a:t>
             </a:fld>
             <a:endParaRPr lang="en-US"/>
           </a:p>
@@ -2822,7 +2822,7 @@
           <a:p>
             <a:fld id="{DA0DCAAE-88C2-4711-BA08-F240E32515AA}" type="datetimeFigureOut">
               <a:rPr lang="en-US" smtClean="0"/>
-              <a:t>12/5/2018</a:t>
+              <a:t>12/6/2018</a:t>
             </a:fld>
             <a:endParaRPr lang="en-US"/>
           </a:p>
@@ -3072,7 +3072,7 @@
           <a:p>
             <a:fld id="{DA0DCAAE-88C2-4711-BA08-F240E32515AA}" type="datetimeFigureOut">
               <a:rPr lang="en-US" smtClean="0"/>
-              <a:t>12/5/2018</a:t>
+              <a:t>12/6/2018</a:t>
             </a:fld>
             <a:endParaRPr lang="en-US"/>
           </a:p>
@@ -3308,7 +3308,7 @@
           <a:p>
             <a:fld id="{DA0DCAAE-88C2-4711-BA08-F240E32515AA}" type="datetimeFigureOut">
               <a:rPr lang="en-US" smtClean="0"/>
-              <a:t>12/5/2018</a:t>
+              <a:t>12/6/2018</a:t>
             </a:fld>
             <a:endParaRPr lang="en-US"/>
           </a:p>
@@ -3690,7 +3690,7 @@
           <a:p>
             <a:fld id="{DA0DCAAE-88C2-4711-BA08-F240E32515AA}" type="datetimeFigureOut">
               <a:rPr lang="en-US" smtClean="0"/>
-              <a:t>12/5/2018</a:t>
+              <a:t>12/6/2018</a:t>
             </a:fld>
             <a:endParaRPr lang="en-US"/>
           </a:p>
@@ -3808,7 +3808,7 @@
           <a:p>
             <a:fld id="{DA0DCAAE-88C2-4711-BA08-F240E32515AA}" type="datetimeFigureOut">
               <a:rPr lang="en-US" smtClean="0"/>
-              <a:t>12/5/2018</a:t>
+              <a:t>12/6/2018</a:t>
             </a:fld>
             <a:endParaRPr lang="en-US"/>
           </a:p>
@@ -3903,7 +3903,7 @@
           <a:p>
             <a:fld id="{DA0DCAAE-88C2-4711-BA08-F240E32515AA}" type="datetimeFigureOut">
               <a:rPr lang="en-US" smtClean="0"/>
-              <a:t>12/5/2018</a:t>
+              <a:t>12/6/2018</a:t>
             </a:fld>
             <a:endParaRPr lang="en-US"/>
           </a:p>
@@ -4158,7 +4158,7 @@
           <a:p>
             <a:fld id="{DA0DCAAE-88C2-4711-BA08-F240E32515AA}" type="datetimeFigureOut">
               <a:rPr lang="en-US" smtClean="0"/>
-              <a:t>12/5/2018</a:t>
+              <a:t>12/6/2018</a:t>
             </a:fld>
             <a:endParaRPr lang="en-US"/>
           </a:p>
@@ -4441,7 +4441,7 @@
           <a:p>
             <a:fld id="{DA0DCAAE-88C2-4711-BA08-F240E32515AA}" type="datetimeFigureOut">
               <a:rPr lang="en-US" smtClean="0"/>
-              <a:t>12/5/2018</a:t>
+              <a:t>12/6/2018</a:t>
             </a:fld>
             <a:endParaRPr lang="en-US"/>
           </a:p>
@@ -4847,7 +4847,7 @@
           <a:p>
             <a:fld id="{DA0DCAAE-88C2-4711-BA08-F240E32515AA}" type="datetimeFigureOut">
               <a:rPr lang="en-US" smtClean="0"/>
-              <a:t>12/5/2018</a:t>
+              <a:t>12/6/2018</a:t>
             </a:fld>
             <a:endParaRPr lang="en-US"/>
           </a:p>
@@ -5550,148 +5550,6 @@
         </p:nvSpPr>
         <p:spPr>
           <a:xfrm>
-            <a:off x="684213" y="685800"/>
-            <a:ext cx="10058400" cy="645695"/>
-          </a:xfrm>
-        </p:spPr>
-        <p:txBody>
-          <a:bodyPr>
-            <a:noAutofit/>
-          </a:bodyPr>
-          <a:lstStyle/>
-          <a:p>
-            <a:r>
-              <a:rPr lang="en-US" sz="6000" dirty="0" smtClean="0"/>
-              <a:t>IP used</a:t>
-            </a:r>
-            <a:endParaRPr lang="en-US" sz="6000" dirty="0"/>
-          </a:p>
-        </p:txBody>
-      </p:sp>
-      <p:sp>
-        <p:nvSpPr>
-          <p:cNvPr id="7" name="TextBox 6"/>
-          <p:cNvSpPr txBox="1"/>
-          <p:nvPr/>
-        </p:nvSpPr>
-        <p:spPr>
-          <a:xfrm>
-            <a:off x="684213" y="2085473"/>
-            <a:ext cx="10930271" cy="3477875"/>
-          </a:xfrm>
-          <a:prstGeom prst="rect">
-            <a:avLst/>
-          </a:prstGeom>
-          <a:noFill/>
-        </p:spPr>
-        <p:txBody>
-          <a:bodyPr wrap="square" rtlCol="0">
-            <a:spAutoFit/>
-          </a:bodyPr>
-          <a:lstStyle/>
-          <a:p>
-            <a:pPr marL="342900" indent="-342900">
-              <a:buFont typeface="Arial" panose="020B0604020202020204" pitchFamily="34" charset="0"/>
-              <a:buChar char="•"/>
-            </a:pPr>
-            <a:r>
-              <a:rPr lang="en-US" sz="4400" dirty="0" smtClean="0"/>
-              <a:t>Eagle</a:t>
-            </a:r>
-          </a:p>
-          <a:p>
-            <a:pPr marL="342900" indent="-342900">
-              <a:buFont typeface="Arial" panose="020B0604020202020204" pitchFamily="34" charset="0"/>
-              <a:buChar char="•"/>
-            </a:pPr>
-            <a:r>
-              <a:rPr lang="en-US" sz="4400" dirty="0" smtClean="0"/>
-              <a:t>LT Spice</a:t>
-            </a:r>
-          </a:p>
-          <a:p>
-            <a:pPr marL="342900" indent="-342900">
-              <a:buFont typeface="Arial" panose="020B0604020202020204" pitchFamily="34" charset="0"/>
-              <a:buChar char="•"/>
-            </a:pPr>
-            <a:r>
-              <a:rPr lang="en-US" sz="4400" dirty="0" smtClean="0"/>
-              <a:t>Microsoft Office</a:t>
-            </a:r>
-          </a:p>
-          <a:p>
-            <a:pPr marL="342900" indent="-342900">
-              <a:buFont typeface="Arial" panose="020B0604020202020204" pitchFamily="34" charset="0"/>
-              <a:buChar char="•"/>
-            </a:pPr>
-            <a:r>
-              <a:rPr lang="en-US" sz="4400" dirty="0" err="1" smtClean="0"/>
-              <a:t>Github</a:t>
-            </a:r>
-            <a:endParaRPr lang="en-US" sz="4400" dirty="0" smtClean="0"/>
-          </a:p>
-          <a:p>
-            <a:pPr marL="342900" indent="-342900">
-              <a:buFont typeface="Arial" panose="020B0604020202020204" pitchFamily="34" charset="0"/>
-              <a:buChar char="•"/>
-            </a:pPr>
-            <a:r>
-              <a:rPr lang="en-US" sz="4400" dirty="0" smtClean="0"/>
-              <a:t>Arduino</a:t>
-            </a:r>
-            <a:endParaRPr lang="en-US" sz="4400" dirty="0"/>
-          </a:p>
-        </p:txBody>
-      </p:sp>
-    </p:spTree>
-    <p:extLst>
-      <p:ext uri="{BB962C8B-B14F-4D97-AF65-F5344CB8AC3E}">
-        <p14:creationId xmlns:p14="http://schemas.microsoft.com/office/powerpoint/2010/main" val="139375834"/>
-      </p:ext>
-    </p:extLst>
-  </p:cSld>
-  <p:clrMapOvr>
-    <a:masterClrMapping/>
-  </p:clrMapOvr>
-  <p:timing>
-    <p:tnLst>
-      <p:par>
-        <p:cTn id="1" dur="indefinite" restart="never" nodeType="tmRoot"/>
-      </p:par>
-    </p:tnLst>
-  </p:timing>
-</p:sld>
-</file>
-
-<file path=ppt/slides/slide11.xml><?xml version="1.0" encoding="utf-8"?>
-<p:sld xmlns:a="http://schemas.openxmlformats.org/drawingml/2006/main" xmlns:r="http://schemas.openxmlformats.org/officeDocument/2006/relationships" xmlns:p="http://schemas.openxmlformats.org/presentationml/2006/main">
-  <p:cSld>
-    <p:spTree>
-      <p:nvGrpSpPr>
-        <p:cNvPr id="1" name=""/>
-        <p:cNvGrpSpPr/>
-        <p:nvPr/>
-      </p:nvGrpSpPr>
-      <p:grpSpPr>
-        <a:xfrm>
-          <a:off x="0" y="0"/>
-          <a:ext cx="0" cy="0"/>
-          <a:chOff x="0" y="0"/>
-          <a:chExt cx="0" cy="0"/>
-        </a:xfrm>
-      </p:grpSpPr>
-      <p:sp>
-        <p:nvSpPr>
-          <p:cNvPr id="4" name="Title 3"/>
-          <p:cNvSpPr>
-            <a:spLocks noGrp="1"/>
-          </p:cNvSpPr>
-          <p:nvPr>
-            <p:ph type="title"/>
-          </p:nvPr>
-        </p:nvSpPr>
-        <p:spPr>
-          <a:xfrm>
             <a:off x="667587" y="120534"/>
             <a:ext cx="10058400" cy="645695"/>
           </a:xfrm>
@@ -5719,7 +5577,7 @@
           <p:nvPr>
             <p:extLst>
               <p:ext uri="{D42A27DB-BD31-4B8C-83A1-F6EECF244321}">
-                <p14:modId xmlns:p14="http://schemas.microsoft.com/office/powerpoint/2010/main" val="2638268666"/>
+                <p14:modId xmlns:p14="http://schemas.microsoft.com/office/powerpoint/2010/main" val="3617735929"/>
               </p:ext>
             </p:extLst>
           </p:nvPr>
@@ -6235,12 +6093,12 @@
                     <a:p>
                       <a:pPr algn="r" fontAlgn="b"/>
                       <a:r>
-                        <a:rPr lang="en-US" sz="900" u="none" strike="noStrike">
+                        <a:rPr lang="en-US" sz="900" b="1" u="none" strike="noStrike" dirty="0">
                           <a:effectLst/>
                         </a:rPr>
                         <a:t>3.49</a:t>
                       </a:r>
-                      <a:endParaRPr lang="en-US" sz="900" b="0" i="0" u="none" strike="noStrike">
+                      <a:endParaRPr lang="en-US" sz="900" b="1" i="0" u="none" strike="noStrike" dirty="0">
                         <a:solidFill>
                           <a:srgbClr val="000000"/>
                         </a:solidFill>
@@ -6258,12 +6116,12 @@
                     <a:p>
                       <a:pPr algn="r" fontAlgn="b"/>
                       <a:r>
-                        <a:rPr lang="en-US" sz="900" u="none" strike="noStrike">
+                        <a:rPr lang="en-US" sz="900" b="1" u="none" strike="noStrike" dirty="0">
                           <a:effectLst/>
                         </a:rPr>
                         <a:t>3.49</a:t>
                       </a:r>
-                      <a:endParaRPr lang="en-US" sz="900" b="0" i="0" u="none" strike="noStrike">
+                      <a:endParaRPr lang="en-US" sz="900" b="1" i="0" u="none" strike="noStrike" dirty="0">
                         <a:solidFill>
                           <a:srgbClr val="000000"/>
                         </a:solidFill>
@@ -6472,12 +6330,12 @@
                     <a:p>
                       <a:pPr algn="r" fontAlgn="b"/>
                       <a:r>
-                        <a:rPr lang="en-US" sz="900" u="none" strike="noStrike">
+                        <a:rPr lang="en-US" sz="900" b="1" u="none" strike="noStrike" dirty="0">
                           <a:effectLst/>
                         </a:rPr>
                         <a:t>0.82</a:t>
                       </a:r>
-                      <a:endParaRPr lang="en-US" sz="900" b="0" i="0" u="none" strike="noStrike">
+                      <a:endParaRPr lang="en-US" sz="900" b="1" i="0" u="none" strike="noStrike" dirty="0">
                         <a:solidFill>
                           <a:srgbClr val="000000"/>
                         </a:solidFill>
@@ -6495,12 +6353,12 @@
                     <a:p>
                       <a:pPr algn="r" fontAlgn="b"/>
                       <a:r>
-                        <a:rPr lang="en-US" sz="900" u="none" strike="noStrike">
+                        <a:rPr lang="en-US" sz="900" b="1" u="none" strike="noStrike" dirty="0">
                           <a:effectLst/>
                         </a:rPr>
                         <a:t>0.82</a:t>
                       </a:r>
-                      <a:endParaRPr lang="en-US" sz="900" b="0" i="0" u="none" strike="noStrike">
+                      <a:endParaRPr lang="en-US" sz="900" b="1" i="0" u="none" strike="noStrike" dirty="0">
                         <a:solidFill>
                           <a:srgbClr val="000000"/>
                         </a:solidFill>
@@ -6709,12 +6567,12 @@
                     <a:p>
                       <a:pPr algn="r" fontAlgn="b"/>
                       <a:r>
-                        <a:rPr lang="en-US" sz="900" u="none" strike="noStrike">
+                        <a:rPr lang="en-US" sz="900" u="none" strike="noStrike" dirty="0">
                           <a:effectLst/>
                         </a:rPr>
                         <a:t>0.53</a:t>
                       </a:r>
-                      <a:endParaRPr lang="en-US" sz="900" b="0" i="0" u="none" strike="noStrike">
+                      <a:endParaRPr lang="en-US" sz="900" b="0" i="0" u="none" strike="noStrike" dirty="0">
                         <a:solidFill>
                           <a:srgbClr val="000000"/>
                         </a:solidFill>
@@ -6946,12 +6804,12 @@
                     <a:p>
                       <a:pPr algn="r" fontAlgn="b"/>
                       <a:r>
-                        <a:rPr lang="en-US" sz="900" u="none" strike="noStrike">
+                        <a:rPr lang="en-US" sz="900" u="none" strike="noStrike" dirty="0">
                           <a:effectLst/>
                         </a:rPr>
                         <a:t>0.02397</a:t>
                       </a:r>
-                      <a:endParaRPr lang="en-US" sz="900" b="0" i="0" u="none" strike="noStrike">
+                      <a:endParaRPr lang="en-US" sz="900" b="0" i="0" u="none" strike="noStrike" dirty="0">
                         <a:solidFill>
                           <a:srgbClr val="000000"/>
                         </a:solidFill>
@@ -7443,12 +7301,12 @@
                     <a:p>
                       <a:pPr algn="r" fontAlgn="b"/>
                       <a:r>
-                        <a:rPr lang="en-US" sz="900" u="none" strike="noStrike">
+                        <a:rPr lang="en-US" sz="900" u="none" strike="noStrike" dirty="0">
                           <a:effectLst/>
                         </a:rPr>
                         <a:t>0.02397</a:t>
                       </a:r>
-                      <a:endParaRPr lang="en-US" sz="900" b="0" i="0" u="none" strike="noStrike">
+                      <a:endParaRPr lang="en-US" sz="900" b="0" i="0" u="none" strike="noStrike" dirty="0">
                         <a:solidFill>
                           <a:srgbClr val="000000"/>
                         </a:solidFill>
@@ -8536,12 +8394,36 @@
                     <a:p>
                       <a:pPr algn="l" fontAlgn="b"/>
                       <a:r>
-                        <a:rPr lang="es-ES" sz="900" u="none" strike="noStrike">
-                          <a:effectLst/>
-                        </a:rPr>
-                        <a:t>0.1µF -20%, +80% 50V Ceramic Capacitor Y5V (F) 0805 (2012 Metric)</a:t>
-                      </a:r>
-                      <a:endParaRPr lang="es-ES" sz="900" b="0" i="0" u="none" strike="noStrike">
+                        <a:rPr lang="es-ES" sz="900" u="none" strike="noStrike" dirty="0">
+                          <a:effectLst/>
+                        </a:rPr>
+                        <a:t>0.1µF -20%, +80% 50V </a:t>
+                      </a:r>
+                      <a:r>
+                        <a:rPr lang="es-ES" sz="900" u="none" strike="noStrike" dirty="0" err="1">
+                          <a:effectLst/>
+                        </a:rPr>
+                        <a:t>Ceramic</a:t>
+                      </a:r>
+                      <a:r>
+                        <a:rPr lang="es-ES" sz="900" u="none" strike="noStrike" dirty="0">
+                          <a:effectLst/>
+                        </a:rPr>
+                        <a:t> Capacitor Y5V (F) 0805 (2012 </a:t>
+                      </a:r>
+                      <a:r>
+                        <a:rPr lang="es-ES" sz="900" u="none" strike="noStrike" dirty="0" err="1">
+                          <a:effectLst/>
+                        </a:rPr>
+                        <a:t>Metric</a:t>
+                      </a:r>
+                      <a:r>
+                        <a:rPr lang="es-ES" sz="900" u="none" strike="noStrike" dirty="0">
+                          <a:effectLst/>
+                        </a:rPr>
+                        <a:t>)</a:t>
+                      </a:r>
+                      <a:endParaRPr lang="es-ES" sz="900" b="0" i="0" u="none" strike="noStrike" dirty="0">
                         <a:solidFill>
                           <a:srgbClr val="000000"/>
                         </a:solidFill>
@@ -8628,12 +8510,12 @@
                     <a:p>
                       <a:pPr algn="r" fontAlgn="b"/>
                       <a:r>
-                        <a:rPr lang="en-US" sz="900" u="none" strike="noStrike">
+                        <a:rPr lang="en-US" sz="900" u="none" strike="noStrike" dirty="0">
                           <a:effectLst/>
                         </a:rPr>
                         <a:t>0.96</a:t>
                       </a:r>
-                      <a:endParaRPr lang="en-US" sz="900" b="0" i="0" u="none" strike="noStrike">
+                      <a:endParaRPr lang="en-US" sz="900" b="0" i="0" u="none" strike="noStrike" dirty="0">
                         <a:solidFill>
                           <a:srgbClr val="000000"/>
                         </a:solidFill>
@@ -8865,12 +8747,12 @@
                     <a:p>
                       <a:pPr algn="r" fontAlgn="b"/>
                       <a:r>
-                        <a:rPr lang="en-US" sz="900" u="none" strike="noStrike">
+                        <a:rPr lang="en-US" sz="900" u="none" strike="noStrike" dirty="0">
                           <a:effectLst/>
                         </a:rPr>
                         <a:t>0.28</a:t>
                       </a:r>
-                      <a:endParaRPr lang="en-US" sz="900" b="0" i="0" u="none" strike="noStrike">
+                      <a:endParaRPr lang="en-US" sz="900" b="0" i="0" u="none" strike="noStrike" dirty="0">
                         <a:solidFill>
                           <a:srgbClr val="000000"/>
                         </a:solidFill>
@@ -9339,12 +9221,12 @@
                     <a:p>
                       <a:pPr algn="r" fontAlgn="b"/>
                       <a:r>
-                        <a:rPr lang="en-US" sz="900" u="none" strike="noStrike">
+                        <a:rPr lang="en-US" sz="900" u="none" strike="noStrike" dirty="0">
                           <a:effectLst/>
                         </a:rPr>
                         <a:t>0.2</a:t>
                       </a:r>
-                      <a:endParaRPr lang="en-US" sz="900" b="0" i="0" u="none" strike="noStrike">
+                      <a:endParaRPr lang="en-US" sz="900" b="0" i="0" u="none" strike="noStrike" dirty="0">
                         <a:solidFill>
                           <a:srgbClr val="000000"/>
                         </a:solidFill>
@@ -10027,12 +9909,12 @@
                     <a:p>
                       <a:pPr algn="r" fontAlgn="b"/>
                       <a:r>
-                        <a:rPr lang="en-US" sz="900" u="none" strike="noStrike">
+                        <a:rPr lang="en-US" sz="900" b="1" u="none" strike="noStrike" dirty="0">
                           <a:effectLst/>
                         </a:rPr>
                         <a:t>0.85</a:t>
                       </a:r>
-                      <a:endParaRPr lang="en-US" sz="900" b="0" i="0" u="none" strike="noStrike">
+                      <a:endParaRPr lang="en-US" sz="900" b="1" i="0" u="none" strike="noStrike" dirty="0">
                         <a:solidFill>
                           <a:srgbClr val="000000"/>
                         </a:solidFill>
@@ -10050,12 +9932,12 @@
                     <a:p>
                       <a:pPr algn="r" fontAlgn="b"/>
                       <a:r>
-                        <a:rPr lang="en-US" sz="900" u="none" strike="noStrike">
+                        <a:rPr lang="en-US" sz="900" b="1" u="none" strike="noStrike" dirty="0">
                           <a:effectLst/>
                         </a:rPr>
                         <a:t>0.85</a:t>
                       </a:r>
-                      <a:endParaRPr lang="en-US" sz="900" b="0" i="0" u="none" strike="noStrike">
+                      <a:endParaRPr lang="en-US" sz="900" b="1" i="0" u="none" strike="noStrike" dirty="0">
                         <a:solidFill>
                           <a:srgbClr val="000000"/>
                         </a:solidFill>
@@ -10738,12 +10620,12 @@
                     <a:p>
                       <a:pPr algn="r" fontAlgn="b"/>
                       <a:r>
-                        <a:rPr lang="en-US" sz="900" u="none" strike="noStrike">
+                        <a:rPr lang="en-US" sz="900" b="1" u="none" strike="noStrike" dirty="0">
                           <a:effectLst/>
                         </a:rPr>
                         <a:t>0.57</a:t>
                       </a:r>
-                      <a:endParaRPr lang="en-US" sz="900" b="0" i="0" u="none" strike="noStrike">
+                      <a:endParaRPr lang="en-US" sz="900" b="1" i="0" u="none" strike="noStrike" dirty="0">
                         <a:solidFill>
                           <a:srgbClr val="000000"/>
                         </a:solidFill>
@@ -10761,12 +10643,12 @@
                     <a:p>
                       <a:pPr algn="r" fontAlgn="b"/>
                       <a:r>
-                        <a:rPr lang="en-US" sz="900" u="none" strike="noStrike">
+                        <a:rPr lang="en-US" sz="900" b="1" u="none" strike="noStrike" dirty="0">
                           <a:effectLst/>
                         </a:rPr>
                         <a:t>1.14</a:t>
                       </a:r>
-                      <a:endParaRPr lang="en-US" sz="900" b="0" i="0" u="none" strike="noStrike">
+                      <a:endParaRPr lang="en-US" sz="900" b="1" i="0" u="none" strike="noStrike" dirty="0">
                         <a:solidFill>
                           <a:srgbClr val="000000"/>
                         </a:solidFill>
@@ -11133,10 +11015,16 @@
                     <a:p>
                       <a:pPr algn="l" fontAlgn="b"/>
                       <a:r>
-                        <a:rPr lang="en-US" sz="900" u="none" strike="noStrike" dirty="0">
-                          <a:effectLst/>
-                        </a:rPr>
-                        <a:t> $         10.25 </a:t>
+                        <a:rPr lang="en-US" sz="900" b="1" u="none" strike="noStrike" dirty="0">
+                          <a:effectLst/>
+                        </a:rPr>
+                        <a:t> $        </a:t>
+                      </a:r>
+                      <a:r>
+                        <a:rPr lang="en-US" sz="900" b="1" u="none" strike="noStrike" dirty="0" smtClean="0">
+                          <a:effectLst/>
+                        </a:rPr>
+                        <a:t>10.25 </a:t>
                       </a:r>
                       <a:endParaRPr lang="en-US" sz="900" b="1" i="0" u="none" strike="noStrike" dirty="0">
                         <a:solidFill>
@@ -11163,6 +11051,103 @@
     <p:extLst>
       <p:ext uri="{BB962C8B-B14F-4D97-AF65-F5344CB8AC3E}">
         <p14:creationId xmlns:p14="http://schemas.microsoft.com/office/powerpoint/2010/main" val="2500951938"/>
+      </p:ext>
+    </p:extLst>
+  </p:cSld>
+  <p:clrMapOvr>
+    <a:masterClrMapping/>
+  </p:clrMapOvr>
+  <p:timing>
+    <p:tnLst>
+      <p:par>
+        <p:cTn id="1" dur="indefinite" restart="never" nodeType="tmRoot"/>
+      </p:par>
+    </p:tnLst>
+  </p:timing>
+</p:sld>
+</file>
+
+<file path=ppt/slides/slide11.xml><?xml version="1.0" encoding="utf-8"?>
+<p:sld xmlns:a="http://schemas.openxmlformats.org/drawingml/2006/main" xmlns:r="http://schemas.openxmlformats.org/officeDocument/2006/relationships" xmlns:p="http://schemas.openxmlformats.org/presentationml/2006/main">
+  <p:cSld>
+    <p:spTree>
+      <p:nvGrpSpPr>
+        <p:cNvPr id="1" name=""/>
+        <p:cNvGrpSpPr/>
+        <p:nvPr/>
+      </p:nvGrpSpPr>
+      <p:grpSpPr>
+        <a:xfrm>
+          <a:off x="0" y="0"/>
+          <a:ext cx="0" cy="0"/>
+          <a:chOff x="0" y="0"/>
+          <a:chExt cx="0" cy="0"/>
+        </a:xfrm>
+      </p:grpSpPr>
+      <p:sp>
+        <p:nvSpPr>
+          <p:cNvPr id="4" name="Title 3"/>
+          <p:cNvSpPr>
+            <a:spLocks noGrp="1"/>
+          </p:cNvSpPr>
+          <p:nvPr>
+            <p:ph type="title"/>
+          </p:nvPr>
+        </p:nvSpPr>
+        <p:spPr>
+          <a:xfrm>
+            <a:off x="684213" y="685800"/>
+            <a:ext cx="10058400" cy="645695"/>
+          </a:xfrm>
+        </p:spPr>
+        <p:txBody>
+          <a:bodyPr>
+            <a:noAutofit/>
+          </a:bodyPr>
+          <a:lstStyle/>
+          <a:p>
+            <a:r>
+              <a:rPr lang="en-US" sz="6000" dirty="0" smtClean="0"/>
+              <a:t>Test plan 1</a:t>
+            </a:r>
+            <a:endParaRPr lang="en-US" sz="6000" dirty="0"/>
+          </a:p>
+        </p:txBody>
+      </p:sp>
+      <p:pic>
+        <p:nvPicPr>
+          <p:cNvPr id="2" name="Picture 1"/>
+          <p:cNvPicPr>
+            <a:picLocks noChangeAspect="1"/>
+          </p:cNvPicPr>
+          <p:nvPr/>
+        </p:nvPicPr>
+        <p:blipFill>
+          <a:blip r:embed="rId2">
+            <a:extLst>
+              <a:ext uri="{28A0092B-C50C-407E-A947-70E740481C1C}">
+                <a14:useLocalDpi xmlns:a14="http://schemas.microsoft.com/office/drawing/2010/main" val="0"/>
+              </a:ext>
+            </a:extLst>
+          </a:blip>
+          <a:stretch>
+            <a:fillRect/>
+          </a:stretch>
+        </p:blipFill>
+        <p:spPr>
+          <a:xfrm>
+            <a:off x="1828799" y="1833421"/>
+            <a:ext cx="7456212" cy="3804711"/>
+          </a:xfrm>
+          <a:prstGeom prst="rect">
+            <a:avLst/>
+          </a:prstGeom>
+        </p:spPr>
+      </p:pic>
+    </p:spTree>
+    <p:extLst>
+      <p:ext uri="{BB962C8B-B14F-4D97-AF65-F5344CB8AC3E}">
+        <p14:creationId xmlns:p14="http://schemas.microsoft.com/office/powerpoint/2010/main" val="599824598"/>
       </p:ext>
     </p:extLst>
   </p:cSld>
@@ -11220,46 +11205,481 @@
           <a:p>
             <a:r>
               <a:rPr lang="en-US" sz="6000" dirty="0" smtClean="0"/>
-              <a:t>Test plan 1</a:t>
+              <a:t>Test plan 2</a:t>
             </a:r>
             <a:endParaRPr lang="en-US" sz="6000" dirty="0"/>
           </a:p>
         </p:txBody>
       </p:sp>
-      <p:pic>
-        <p:nvPicPr>
-          <p:cNvPr id="2" name="Picture 1"/>
-          <p:cNvPicPr>
-            <a:picLocks noChangeAspect="1"/>
-          </p:cNvPicPr>
+      <p:sp>
+        <p:nvSpPr>
+          <p:cNvPr id="2" name="TextBox 1"/>
+          <p:cNvSpPr txBox="1"/>
           <p:nvPr/>
-        </p:nvPicPr>
-        <p:blipFill>
-          <a:blip r:embed="rId2">
-            <a:extLst>
-              <a:ext uri="{28A0092B-C50C-407E-A947-70E740481C1C}">
-                <a14:useLocalDpi xmlns:a14="http://schemas.microsoft.com/office/drawing/2010/main" val="0"/>
-              </a:ext>
-            </a:extLst>
-          </a:blip>
-          <a:stretch>
-            <a:fillRect/>
-          </a:stretch>
-        </p:blipFill>
+        </p:nvSpPr>
         <p:spPr>
           <a:xfrm>
-            <a:off x="1828799" y="1833421"/>
-            <a:ext cx="7456212" cy="3804711"/>
+            <a:off x="532015" y="1637607"/>
+            <a:ext cx="3857105" cy="5286062"/>
           </a:xfrm>
           <a:prstGeom prst="rect">
             <a:avLst/>
           </a:prstGeom>
+          <a:noFill/>
         </p:spPr>
-      </p:pic>
+        <p:txBody>
+          <a:bodyPr wrap="square" rtlCol="0">
+            <a:spAutoFit/>
+          </a:bodyPr>
+          <a:lstStyle/>
+          <a:p>
+            <a:r>
+              <a:rPr lang="en-US" sz="750" dirty="0"/>
+              <a:t>PART 1: Initial Power Setup</a:t>
+            </a:r>
+          </a:p>
+          <a:p>
+            <a:r>
+              <a:rPr lang="en-US" sz="750" dirty="0"/>
+              <a:t>1. Before Power is provided to the board for the first time a visual inspection should be</a:t>
+            </a:r>
+          </a:p>
+          <a:p>
+            <a:r>
+              <a:rPr lang="en-US" sz="750" dirty="0"/>
+              <a:t>performed by a at least one person whom is not the assembler.</a:t>
+            </a:r>
+          </a:p>
+          <a:p>
+            <a:r>
+              <a:rPr lang="en-US" sz="750" dirty="0"/>
+              <a:t>2. Power module test:</a:t>
+            </a:r>
+          </a:p>
+          <a:p>
+            <a:r>
+              <a:rPr lang="en-US" sz="750" dirty="0"/>
+              <a:t>a. Power cable connection test</a:t>
+            </a:r>
+          </a:p>
+          <a:p>
+            <a:r>
+              <a:rPr lang="en-US" sz="750" dirty="0"/>
+              <a:t>b. Voltage regulator test</a:t>
+            </a:r>
+          </a:p>
+          <a:p>
+            <a:r>
+              <a:rPr lang="en-US" sz="750" dirty="0"/>
+              <a:t>3. Power up test:</a:t>
+            </a:r>
+          </a:p>
+          <a:p>
+            <a:r>
+              <a:rPr lang="en-US" sz="750" dirty="0"/>
+              <a:t>a. Current level test</a:t>
+            </a:r>
+          </a:p>
+          <a:p>
+            <a:r>
+              <a:rPr lang="en-US" sz="750" dirty="0"/>
+              <a:t>b. Voltage level check</a:t>
+            </a:r>
+          </a:p>
+          <a:p>
+            <a:r>
+              <a:rPr lang="en-US" sz="750" dirty="0"/>
+              <a:t>c. Leakage check: Check movement of current between two conductors that are not</a:t>
+            </a:r>
+          </a:p>
+          <a:p>
+            <a:r>
+              <a:rPr lang="en-US" sz="750" dirty="0"/>
+              <a:t>connected.</a:t>
+            </a:r>
+          </a:p>
+          <a:p>
+            <a:r>
+              <a:rPr lang="en-US" sz="750" dirty="0"/>
+              <a:t>d. Opens Test: Check to make sure there is current flow from one "node" to the next</a:t>
+            </a:r>
+          </a:p>
+          <a:p>
+            <a:r>
+              <a:rPr lang="en-US" sz="750" dirty="0"/>
+              <a:t>for every net on the board, again by measuring the amount of resistance of the</a:t>
+            </a:r>
+          </a:p>
+          <a:p>
+            <a:r>
+              <a:rPr lang="en-US" sz="750" dirty="0"/>
+              <a:t>conductor.</a:t>
+            </a:r>
+          </a:p>
+          <a:p>
+            <a:r>
+              <a:rPr lang="en-US" sz="750" dirty="0"/>
+              <a:t>e. Shorts Test: Check to make sure that NO current flows between separate nets by</a:t>
+            </a:r>
+          </a:p>
+          <a:p>
+            <a:r>
+              <a:rPr lang="en-US" sz="750" dirty="0"/>
+              <a:t>measuring the amount resistance between them.</a:t>
+            </a:r>
+          </a:p>
+          <a:p>
+            <a:r>
+              <a:rPr lang="en-US" sz="750" dirty="0"/>
+              <a:t>2</a:t>
+            </a:r>
+          </a:p>
+          <a:p>
+            <a:r>
+              <a:rPr lang="en-US" sz="750" dirty="0"/>
+              <a:t>PART 2: System test</a:t>
+            </a:r>
+          </a:p>
+          <a:p>
+            <a:r>
+              <a:rPr lang="en-US" sz="750" dirty="0"/>
+              <a:t>The test session of the system includes two parts:</a:t>
+            </a:r>
+          </a:p>
+          <a:p>
+            <a:r>
+              <a:rPr lang="en-US" sz="750" dirty="0"/>
+              <a:t>1. Single component test:</a:t>
+            </a:r>
+          </a:p>
+          <a:p>
+            <a:r>
+              <a:rPr lang="en-US" sz="750" dirty="0"/>
+              <a:t>a. Check the type and the specification model of the sensor and actuator</a:t>
+            </a:r>
+          </a:p>
+          <a:p>
+            <a:r>
+              <a:rPr lang="en-US" sz="750" dirty="0"/>
+              <a:t>b. Test the functionality of the sensor and actuator</a:t>
+            </a:r>
+          </a:p>
+          <a:p>
+            <a:r>
+              <a:rPr lang="en-US" sz="750" dirty="0"/>
+              <a:t>2. System test:</a:t>
+            </a:r>
+          </a:p>
+          <a:p>
+            <a:r>
+              <a:rPr lang="en-US" sz="750" dirty="0"/>
+              <a:t>a. Design Validation: PCB Layout validation and code verification.</a:t>
+            </a:r>
+          </a:p>
+          <a:p>
+            <a:r>
+              <a:rPr lang="en-US" sz="750" dirty="0"/>
+              <a:t>b. Manufacturing test: Detect the manufacturing defects.</a:t>
+            </a:r>
+          </a:p>
+          <a:p>
+            <a:r>
+              <a:rPr lang="en-US" sz="750" dirty="0"/>
+              <a:t>c. Function test: Follow the block diagram of the system to make sure each part of</a:t>
+            </a:r>
+          </a:p>
+          <a:p>
+            <a:r>
+              <a:rPr lang="en-US" sz="750" dirty="0"/>
+              <a:t>the system can work correctly.</a:t>
+            </a:r>
+          </a:p>
+          <a:p>
+            <a:r>
+              <a:rPr lang="en-US" sz="750" dirty="0"/>
+              <a:t>PART 2 - 1 - 1: Moisture sensor test (FINISHED)</a:t>
+            </a:r>
+          </a:p>
+          <a:p>
+            <a:r>
+              <a:rPr lang="en-US" sz="750" dirty="0"/>
+              <a:t>A. Structure of the sensor: Moisture sensor is testing the resistance across two probes, the</a:t>
+            </a:r>
+          </a:p>
+          <a:p>
+            <a:r>
+              <a:rPr lang="en-US" sz="750" dirty="0"/>
+              <a:t>moisture level of the soil is represented as the voltage value.</a:t>
+            </a:r>
+          </a:p>
+          <a:p>
+            <a:r>
+              <a:rPr lang="en-US" sz="750" dirty="0"/>
+              <a:t>B. Test Method: Plug the probes into the different soil samples(each soil sample got</a:t>
+            </a:r>
+          </a:p>
+          <a:p>
+            <a:r>
+              <a:rPr lang="en-US" sz="750" dirty="0"/>
+              <a:t>different level moisture), measure the returned voltage level.</a:t>
+            </a:r>
+          </a:p>
+          <a:p>
+            <a:r>
+              <a:rPr lang="en-US" sz="750" dirty="0"/>
+              <a:t>C. Results: By increasing the moisture level of the sample soil, the measured maximum</a:t>
+            </a:r>
+          </a:p>
+          <a:p>
+            <a:r>
+              <a:rPr lang="en-US" sz="750" dirty="0"/>
+              <a:t>voltage level is about 4.3V(Under 5V power supply voltage). The minimum voltage level</a:t>
+            </a:r>
+          </a:p>
+          <a:p>
+            <a:r>
+              <a:rPr lang="en-US" sz="750" dirty="0"/>
+              <a:t>is about 2V.</a:t>
+            </a:r>
+          </a:p>
+          <a:p>
+            <a:r>
+              <a:rPr lang="en-US" sz="750" dirty="0"/>
+              <a:t>PART 2 - 1 </a:t>
+            </a:r>
+            <a:r>
+              <a:rPr lang="en-US" sz="750" dirty="0" smtClean="0"/>
+              <a:t>-</a:t>
+            </a:r>
+            <a:endParaRPr lang="en-US" sz="750" dirty="0"/>
+          </a:p>
+        </p:txBody>
+      </p:sp>
+      <p:sp>
+        <p:nvSpPr>
+          <p:cNvPr id="5" name="TextBox 4"/>
+          <p:cNvSpPr txBox="1"/>
+          <p:nvPr/>
+        </p:nvSpPr>
+        <p:spPr>
+          <a:xfrm>
+            <a:off x="4389120" y="1687354"/>
+            <a:ext cx="3857105" cy="4478149"/>
+          </a:xfrm>
+          <a:prstGeom prst="rect">
+            <a:avLst/>
+          </a:prstGeom>
+          <a:noFill/>
+        </p:spPr>
+        <p:txBody>
+          <a:bodyPr wrap="square" rtlCol="0">
+            <a:spAutoFit/>
+          </a:bodyPr>
+          <a:lstStyle/>
+          <a:p>
+            <a:r>
+              <a:rPr lang="en-US" sz="750" dirty="0" smtClean="0"/>
+              <a:t>PART </a:t>
+            </a:r>
+            <a:r>
+              <a:rPr lang="en-US" sz="750" dirty="0"/>
+              <a:t>2 - 1 - 2: Actuator Test (FINISHED)</a:t>
+            </a:r>
+          </a:p>
+          <a:p>
+            <a:r>
+              <a:rPr lang="en-US" sz="750" dirty="0"/>
+              <a:t>The actuator of the automated watering system is a water valve. The I/O pin of the processor</a:t>
+            </a:r>
+          </a:p>
+          <a:p>
+            <a:r>
+              <a:rPr lang="en-US" sz="750" dirty="0"/>
+              <a:t>control the ON and OFF of the actuator. When the moisture level lower than the threshold value,</a:t>
+            </a:r>
+          </a:p>
+          <a:p>
+            <a:r>
+              <a:rPr lang="en-US" sz="750" dirty="0"/>
+              <a:t>3</a:t>
+            </a:r>
+          </a:p>
+          <a:p>
+            <a:r>
+              <a:rPr lang="en-US" sz="750" dirty="0"/>
+              <a:t>the system will turn on the valve. In other words, the goal of the test is to make sure that the</a:t>
+            </a:r>
+          </a:p>
+          <a:p>
+            <a:r>
+              <a:rPr lang="en-US" sz="750" dirty="0"/>
+              <a:t>actuator is capable for multiple ON/OFF in a short time period.</a:t>
+            </a:r>
+          </a:p>
+          <a:p>
+            <a:r>
+              <a:rPr lang="en-US" sz="750" dirty="0"/>
+              <a:t>A. Test Method: Connect the valve to the output pin of the circuit, run the “Blink” file on</a:t>
+            </a:r>
+          </a:p>
+          <a:p>
+            <a:r>
+              <a:rPr lang="en-US" sz="750" dirty="0"/>
+              <a:t>the circuit.</a:t>
+            </a:r>
+          </a:p>
+          <a:p>
+            <a:r>
+              <a:rPr lang="en-US" sz="750" dirty="0"/>
+              <a:t>B. Results: Run the program for 2 minutes, the system will keep turning ON/OFF of the</a:t>
+            </a:r>
+          </a:p>
+          <a:p>
+            <a:r>
+              <a:rPr lang="en-US" sz="750" dirty="0"/>
+              <a:t>valve, the valve worked correctly.</a:t>
+            </a:r>
+          </a:p>
+          <a:p>
+            <a:r>
+              <a:rPr lang="en-US" sz="750" dirty="0"/>
+              <a:t>PART 2 - 2 - 1: PCB Validation</a:t>
+            </a:r>
+          </a:p>
+          <a:p>
+            <a:r>
+              <a:rPr lang="en-US" sz="750" dirty="0"/>
+              <a:t>A. Parts completion check:</a:t>
+            </a:r>
+          </a:p>
+          <a:p>
+            <a:r>
+              <a:rPr lang="en-US" sz="750" dirty="0"/>
+              <a:t>a. All major components included?</a:t>
+            </a:r>
+          </a:p>
+          <a:p>
+            <a:r>
+              <a:rPr lang="en-US" sz="750" dirty="0" err="1"/>
+              <a:t>i</a:t>
+            </a:r>
+            <a:r>
+              <a:rPr lang="en-US" sz="750" dirty="0"/>
+              <a:t>. Processor</a:t>
+            </a:r>
+          </a:p>
+          <a:p>
+            <a:r>
+              <a:rPr lang="en-US" sz="750" dirty="0"/>
+              <a:t>ii. Power supply (Voltage regulator)</a:t>
+            </a:r>
+          </a:p>
+          <a:p>
+            <a:r>
+              <a:rPr lang="en-US" sz="750" dirty="0"/>
+              <a:t>iii. Moisture sensor</a:t>
+            </a:r>
+          </a:p>
+          <a:p>
+            <a:r>
+              <a:rPr lang="en-US" sz="750" dirty="0"/>
+              <a:t>iv. The actuator (Valve)</a:t>
+            </a:r>
+          </a:p>
+          <a:p>
+            <a:r>
+              <a:rPr lang="en-US" sz="750" dirty="0"/>
+              <a:t>b. All support components included?</a:t>
+            </a:r>
+          </a:p>
+          <a:p>
+            <a:r>
+              <a:rPr lang="en-US" sz="750" dirty="0" err="1"/>
+              <a:t>i</a:t>
+            </a:r>
+            <a:r>
+              <a:rPr lang="en-US" sz="750" dirty="0"/>
+              <a:t>. USB connection port</a:t>
+            </a:r>
+          </a:p>
+          <a:p>
+            <a:r>
+              <a:rPr lang="en-US" sz="750" dirty="0"/>
+              <a:t>ii. Power connection port</a:t>
+            </a:r>
+          </a:p>
+          <a:p>
+            <a:r>
+              <a:rPr lang="en-US" sz="750" dirty="0"/>
+              <a:t>iii. Reset switch</a:t>
+            </a:r>
+          </a:p>
+          <a:p>
+            <a:r>
+              <a:rPr lang="en-US" sz="750" dirty="0"/>
+              <a:t>c. All the surface mount circuit component included?</a:t>
+            </a:r>
+          </a:p>
+          <a:p>
+            <a:r>
+              <a:rPr lang="en-US" sz="750" dirty="0"/>
+              <a:t>B. PCB footprint check</a:t>
+            </a:r>
+          </a:p>
+          <a:p>
+            <a:r>
+              <a:rPr lang="en-US" sz="750" dirty="0"/>
+              <a:t>C. Parts placement test</a:t>
+            </a:r>
+          </a:p>
+          <a:p>
+            <a:r>
+              <a:rPr lang="en-US" sz="750" dirty="0"/>
+              <a:t>PART 2 - 2 - 2: Function Test</a:t>
+            </a:r>
+          </a:p>
+          <a:p>
+            <a:r>
+              <a:rPr lang="en-US" sz="750" dirty="0"/>
+              <a:t>A. Debug the code to make sure the code can successfully flash into the processor.</a:t>
+            </a:r>
+          </a:p>
+          <a:p>
+            <a:r>
+              <a:rPr lang="en-US" sz="750" dirty="0"/>
+              <a:t>4</a:t>
+            </a:r>
+          </a:p>
+          <a:p>
+            <a:r>
+              <a:rPr lang="en-US" sz="750" dirty="0"/>
+              <a:t>B. After the program is flashed to the processor via USB, a test run should be performed.</a:t>
+            </a:r>
+          </a:p>
+          <a:p>
+            <a:r>
+              <a:rPr lang="en-US" sz="750" dirty="0"/>
+              <a:t>PART 2 - 2 - 3: Manufacturing Test</a:t>
+            </a:r>
+          </a:p>
+          <a:p>
+            <a:r>
+              <a:rPr lang="en-US" sz="750" dirty="0"/>
+              <a:t>A. Follow the schematic and assemble the circuit on each board.</a:t>
+            </a:r>
+          </a:p>
+          <a:p>
+            <a:r>
+              <a:rPr lang="en-US" sz="750" dirty="0"/>
+              <a:t>B. Follow the test method in PART 2 - 2 - 2 to test all the prototypes.</a:t>
+            </a:r>
+          </a:p>
+        </p:txBody>
+      </p:sp>
     </p:spTree>
     <p:extLst>
       <p:ext uri="{BB962C8B-B14F-4D97-AF65-F5344CB8AC3E}">
-        <p14:creationId xmlns:p14="http://schemas.microsoft.com/office/powerpoint/2010/main" val="599824598"/>
+        <p14:creationId xmlns:p14="http://schemas.microsoft.com/office/powerpoint/2010/main" val="246382489"/>
       </p:ext>
     </p:extLst>
   </p:cSld>
@@ -11317,7 +11737,7 @@
           <a:p>
             <a:r>
               <a:rPr lang="en-US" sz="6000" dirty="0" smtClean="0"/>
-              <a:t>Test plan 2</a:t>
+              <a:t>what’s left to do</a:t>
             </a:r>
             <a:endParaRPr lang="en-US" sz="6000" dirty="0"/>
           </a:p>
@@ -11325,14 +11745,14 @@
       </p:sp>
       <p:sp>
         <p:nvSpPr>
-          <p:cNvPr id="2" name="TextBox 1"/>
+          <p:cNvPr id="7" name="TextBox 6"/>
           <p:cNvSpPr txBox="1"/>
           <p:nvPr/>
         </p:nvSpPr>
         <p:spPr>
           <a:xfrm>
-            <a:off x="532015" y="1637607"/>
-            <a:ext cx="3857105" cy="5286062"/>
+            <a:off x="684213" y="2085473"/>
+            <a:ext cx="10930271" cy="3970318"/>
           </a:xfrm>
           <a:prstGeom prst="rect">
             <a:avLst/>
@@ -11345,445 +11765,53 @@
           </a:bodyPr>
           <a:lstStyle/>
           <a:p>
-            <a:r>
-              <a:rPr lang="en-US" sz="750" dirty="0"/>
-              <a:t>PART 1: Initial Power Setup</a:t>
-            </a:r>
-          </a:p>
-          <a:p>
-            <a:r>
-              <a:rPr lang="en-US" sz="750" dirty="0"/>
-              <a:t>1. Before Power is provided to the board for the first time a visual inspection should be</a:t>
-            </a:r>
-          </a:p>
-          <a:p>
-            <a:r>
-              <a:rPr lang="en-US" sz="750" dirty="0"/>
-              <a:t>performed by a at least one person whom is not the assembler.</a:t>
-            </a:r>
-          </a:p>
-          <a:p>
-            <a:r>
-              <a:rPr lang="en-US" sz="750" dirty="0"/>
-              <a:t>2. Power module test:</a:t>
-            </a:r>
-          </a:p>
-          <a:p>
-            <a:r>
-              <a:rPr lang="en-US" sz="750" dirty="0"/>
-              <a:t>a. Power cable connection test</a:t>
-            </a:r>
-          </a:p>
-          <a:p>
-            <a:r>
-              <a:rPr lang="en-US" sz="750" dirty="0"/>
-              <a:t>b. Voltage regulator test</a:t>
-            </a:r>
-          </a:p>
-          <a:p>
-            <a:r>
-              <a:rPr lang="en-US" sz="750" dirty="0"/>
-              <a:t>3. Power up test:</a:t>
-            </a:r>
-          </a:p>
-          <a:p>
-            <a:r>
-              <a:rPr lang="en-US" sz="750" dirty="0"/>
-              <a:t>a. Current level test</a:t>
-            </a:r>
-          </a:p>
-          <a:p>
-            <a:r>
-              <a:rPr lang="en-US" sz="750" dirty="0"/>
-              <a:t>b. Voltage level check</a:t>
-            </a:r>
-          </a:p>
-          <a:p>
-            <a:r>
-              <a:rPr lang="en-US" sz="750" dirty="0"/>
-              <a:t>c. Leakage check: Check movement of current between two conductors that are not</a:t>
-            </a:r>
-          </a:p>
-          <a:p>
-            <a:r>
-              <a:rPr lang="en-US" sz="750" dirty="0"/>
-              <a:t>connected.</a:t>
-            </a:r>
-          </a:p>
-          <a:p>
-            <a:r>
-              <a:rPr lang="en-US" sz="750" dirty="0"/>
-              <a:t>d. Opens Test: Check to make sure there is current flow from one "node" to the next</a:t>
-            </a:r>
-          </a:p>
-          <a:p>
-            <a:r>
-              <a:rPr lang="en-US" sz="750" dirty="0"/>
-              <a:t>for every net on the board, again by measuring the amount of resistance of the</a:t>
-            </a:r>
-          </a:p>
-          <a:p>
-            <a:r>
-              <a:rPr lang="en-US" sz="750" dirty="0"/>
-              <a:t>conductor.</a:t>
-            </a:r>
-          </a:p>
-          <a:p>
-            <a:r>
-              <a:rPr lang="en-US" sz="750" dirty="0"/>
-              <a:t>e. Shorts Test: Check to make sure that NO current flows between separate nets by</a:t>
-            </a:r>
-          </a:p>
-          <a:p>
-            <a:r>
-              <a:rPr lang="en-US" sz="750" dirty="0"/>
-              <a:t>measuring the amount resistance between them.</a:t>
-            </a:r>
-          </a:p>
-          <a:p>
-            <a:r>
-              <a:rPr lang="en-US" sz="750" dirty="0"/>
-              <a:t>2</a:t>
-            </a:r>
-          </a:p>
-          <a:p>
-            <a:r>
-              <a:rPr lang="en-US" sz="750" dirty="0"/>
-              <a:t>PART 2: System test</a:t>
-            </a:r>
-          </a:p>
-          <a:p>
-            <a:r>
-              <a:rPr lang="en-US" sz="750" dirty="0"/>
-              <a:t>The test session of the system includes two parts:</a:t>
-            </a:r>
-          </a:p>
-          <a:p>
-            <a:r>
-              <a:rPr lang="en-US" sz="750" dirty="0"/>
-              <a:t>1. Single component test:</a:t>
-            </a:r>
-          </a:p>
-          <a:p>
-            <a:r>
-              <a:rPr lang="en-US" sz="750" dirty="0"/>
-              <a:t>a. Check the type and the specification model of the sensor and actuator</a:t>
-            </a:r>
-          </a:p>
-          <a:p>
-            <a:r>
-              <a:rPr lang="en-US" sz="750" dirty="0"/>
-              <a:t>b. Test the functionality of the sensor and actuator</a:t>
-            </a:r>
-          </a:p>
-          <a:p>
-            <a:r>
-              <a:rPr lang="en-US" sz="750" dirty="0"/>
-              <a:t>2. System test:</a:t>
-            </a:r>
-          </a:p>
-          <a:p>
-            <a:r>
-              <a:rPr lang="en-US" sz="750" dirty="0"/>
-              <a:t>a. Design Validation: PCB Layout validation and code verification.</a:t>
-            </a:r>
-          </a:p>
-          <a:p>
-            <a:r>
-              <a:rPr lang="en-US" sz="750" dirty="0"/>
-              <a:t>b. Manufacturing test: Detect the manufacturing defects.</a:t>
-            </a:r>
-          </a:p>
-          <a:p>
-            <a:r>
-              <a:rPr lang="en-US" sz="750" dirty="0"/>
-              <a:t>c. Function test: Follow the block diagram of the system to make sure each part of</a:t>
-            </a:r>
-          </a:p>
-          <a:p>
-            <a:r>
-              <a:rPr lang="en-US" sz="750" dirty="0"/>
-              <a:t>the system can work correctly.</a:t>
-            </a:r>
-          </a:p>
-          <a:p>
-            <a:r>
-              <a:rPr lang="en-US" sz="750" dirty="0"/>
-              <a:t>PART 2 - 1 - 1: Moisture sensor test (FINISHED)</a:t>
-            </a:r>
-          </a:p>
-          <a:p>
-            <a:r>
-              <a:rPr lang="en-US" sz="750" dirty="0"/>
-              <a:t>A. Structure of the sensor: Moisture sensor is testing the resistance across two probes, the</a:t>
-            </a:r>
-          </a:p>
-          <a:p>
-            <a:r>
-              <a:rPr lang="en-US" sz="750" dirty="0"/>
-              <a:t>moisture level of the soil is represented as the voltage value.</a:t>
-            </a:r>
-          </a:p>
-          <a:p>
-            <a:r>
-              <a:rPr lang="en-US" sz="750" dirty="0"/>
-              <a:t>B. Test Method: Plug the probes into the different soil samples(each soil sample got</a:t>
-            </a:r>
-          </a:p>
-          <a:p>
-            <a:r>
-              <a:rPr lang="en-US" sz="750" dirty="0"/>
-              <a:t>different level moisture), measure the returned voltage level.</a:t>
-            </a:r>
-          </a:p>
-          <a:p>
-            <a:r>
-              <a:rPr lang="en-US" sz="750" dirty="0"/>
-              <a:t>C. Results: By increasing the moisture level of the sample soil, the measured maximum</a:t>
-            </a:r>
-          </a:p>
-          <a:p>
-            <a:r>
-              <a:rPr lang="en-US" sz="750" dirty="0"/>
-              <a:t>voltage level is about 4.3V(Under 5V power supply voltage). The minimum voltage level</a:t>
-            </a:r>
-          </a:p>
-          <a:p>
-            <a:r>
-              <a:rPr lang="en-US" sz="750" dirty="0"/>
-              <a:t>is about 2V.</a:t>
-            </a:r>
-          </a:p>
-          <a:p>
-            <a:r>
-              <a:rPr lang="en-US" sz="750" dirty="0"/>
-              <a:t>PART 2 - 1 </a:t>
-            </a:r>
-            <a:r>
-              <a:rPr lang="en-US" sz="750" dirty="0" smtClean="0"/>
-              <a:t>-</a:t>
-            </a:r>
-            <a:endParaRPr lang="en-US" sz="750" dirty="0"/>
-          </a:p>
-        </p:txBody>
-      </p:sp>
-      <p:sp>
-        <p:nvSpPr>
-          <p:cNvPr id="5" name="TextBox 4"/>
-          <p:cNvSpPr txBox="1"/>
-          <p:nvPr/>
-        </p:nvSpPr>
-        <p:spPr>
-          <a:xfrm>
-            <a:off x="4389120" y="1687354"/>
-            <a:ext cx="3857105" cy="4478149"/>
-          </a:xfrm>
-          <a:prstGeom prst="rect">
-            <a:avLst/>
-          </a:prstGeom>
-          <a:noFill/>
-        </p:spPr>
-        <p:txBody>
-          <a:bodyPr wrap="square" rtlCol="0">
-            <a:spAutoFit/>
-          </a:bodyPr>
-          <a:lstStyle/>
-          <a:p>
-            <a:r>
-              <a:rPr lang="en-US" sz="750" dirty="0" smtClean="0"/>
-              <a:t>PART </a:t>
-            </a:r>
-            <a:r>
-              <a:rPr lang="en-US" sz="750" dirty="0"/>
-              <a:t>2 - 1 - 2: Actuator Test (FINISHED)</a:t>
-            </a:r>
-          </a:p>
-          <a:p>
-            <a:r>
-              <a:rPr lang="en-US" sz="750" dirty="0"/>
-              <a:t>The actuator of the automated watering system is a water valve. The I/O pin of the processor</a:t>
-            </a:r>
-          </a:p>
-          <a:p>
-            <a:r>
-              <a:rPr lang="en-US" sz="750" dirty="0"/>
-              <a:t>control the ON and OFF of the actuator. When the moisture level lower than the threshold value,</a:t>
-            </a:r>
-          </a:p>
-          <a:p>
-            <a:r>
-              <a:rPr lang="en-US" sz="750" dirty="0"/>
-              <a:t>3</a:t>
-            </a:r>
-          </a:p>
-          <a:p>
-            <a:r>
-              <a:rPr lang="en-US" sz="750" dirty="0"/>
-              <a:t>the system will turn on the valve. In other words, the goal of the test is to make sure that the</a:t>
-            </a:r>
-          </a:p>
-          <a:p>
-            <a:r>
-              <a:rPr lang="en-US" sz="750" dirty="0"/>
-              <a:t>actuator is capable for multiple ON/OFF in a short time period.</a:t>
-            </a:r>
-          </a:p>
-          <a:p>
-            <a:r>
-              <a:rPr lang="en-US" sz="750" dirty="0"/>
-              <a:t>A. Test Method: Connect the valve to the output pin of the circuit, run the “Blink” file on</a:t>
-            </a:r>
-          </a:p>
-          <a:p>
-            <a:r>
-              <a:rPr lang="en-US" sz="750" dirty="0"/>
-              <a:t>the circuit.</a:t>
-            </a:r>
-          </a:p>
-          <a:p>
-            <a:r>
-              <a:rPr lang="en-US" sz="750" dirty="0"/>
-              <a:t>B. Results: Run the program for 2 minutes, the system will keep turning ON/OFF of the</a:t>
-            </a:r>
-          </a:p>
-          <a:p>
-            <a:r>
-              <a:rPr lang="en-US" sz="750" dirty="0"/>
-              <a:t>valve, the valve worked correctly.</a:t>
-            </a:r>
-          </a:p>
-          <a:p>
-            <a:r>
-              <a:rPr lang="en-US" sz="750" dirty="0"/>
-              <a:t>PART 2 - 2 - 1: PCB Validation</a:t>
-            </a:r>
-          </a:p>
-          <a:p>
-            <a:r>
-              <a:rPr lang="en-US" sz="750" dirty="0"/>
-              <a:t>A. Parts completion check:</a:t>
-            </a:r>
-          </a:p>
-          <a:p>
-            <a:r>
-              <a:rPr lang="en-US" sz="750" dirty="0"/>
-              <a:t>a. All major components included?</a:t>
-            </a:r>
-          </a:p>
-          <a:p>
-            <a:r>
-              <a:rPr lang="en-US" sz="750" dirty="0" err="1"/>
-              <a:t>i</a:t>
-            </a:r>
-            <a:r>
-              <a:rPr lang="en-US" sz="750" dirty="0"/>
-              <a:t>. Processor</a:t>
-            </a:r>
-          </a:p>
-          <a:p>
-            <a:r>
-              <a:rPr lang="en-US" sz="750" dirty="0"/>
-              <a:t>ii. Power supply (Voltage regulator)</a:t>
-            </a:r>
-          </a:p>
-          <a:p>
-            <a:r>
-              <a:rPr lang="en-US" sz="750" dirty="0"/>
-              <a:t>iii. Moisture sensor</a:t>
-            </a:r>
-          </a:p>
-          <a:p>
-            <a:r>
-              <a:rPr lang="en-US" sz="750" dirty="0"/>
-              <a:t>iv. The actuator (Valve)</a:t>
-            </a:r>
-          </a:p>
-          <a:p>
-            <a:r>
-              <a:rPr lang="en-US" sz="750" dirty="0"/>
-              <a:t>b. All support components included?</a:t>
-            </a:r>
-          </a:p>
-          <a:p>
-            <a:r>
-              <a:rPr lang="en-US" sz="750" dirty="0" err="1"/>
-              <a:t>i</a:t>
-            </a:r>
-            <a:r>
-              <a:rPr lang="en-US" sz="750" dirty="0"/>
-              <a:t>. USB connection port</a:t>
-            </a:r>
-          </a:p>
-          <a:p>
-            <a:r>
-              <a:rPr lang="en-US" sz="750" dirty="0"/>
-              <a:t>ii. Power connection port</a:t>
-            </a:r>
-          </a:p>
-          <a:p>
-            <a:r>
-              <a:rPr lang="en-US" sz="750" dirty="0"/>
-              <a:t>iii. Reset switch</a:t>
-            </a:r>
-          </a:p>
-          <a:p>
-            <a:r>
-              <a:rPr lang="en-US" sz="750" dirty="0"/>
-              <a:t>c. All the surface mount circuit component included?</a:t>
-            </a:r>
-          </a:p>
-          <a:p>
-            <a:r>
-              <a:rPr lang="en-US" sz="750" dirty="0"/>
-              <a:t>B. PCB footprint check</a:t>
-            </a:r>
-          </a:p>
-          <a:p>
-            <a:r>
-              <a:rPr lang="en-US" sz="750" dirty="0"/>
-              <a:t>C. Parts placement test</a:t>
-            </a:r>
-          </a:p>
-          <a:p>
-            <a:r>
-              <a:rPr lang="en-US" sz="750" dirty="0"/>
-              <a:t>PART 2 - 2 - 2: Function Test</a:t>
-            </a:r>
-          </a:p>
-          <a:p>
-            <a:r>
-              <a:rPr lang="en-US" sz="750" dirty="0"/>
-              <a:t>A. Debug the code to make sure the code can successfully flash into the processor.</a:t>
-            </a:r>
-          </a:p>
-          <a:p>
-            <a:r>
-              <a:rPr lang="en-US" sz="750" dirty="0"/>
-              <a:t>4</a:t>
-            </a:r>
-          </a:p>
-          <a:p>
-            <a:r>
-              <a:rPr lang="en-US" sz="750" dirty="0"/>
-              <a:t>B. After the program is flashed to the processor via USB, a test run should be performed.</a:t>
-            </a:r>
-          </a:p>
-          <a:p>
-            <a:r>
-              <a:rPr lang="en-US" sz="750" dirty="0"/>
-              <a:t>PART 2 - 2 - 3: Manufacturing Test</a:t>
-            </a:r>
-          </a:p>
-          <a:p>
-            <a:r>
-              <a:rPr lang="en-US" sz="750" dirty="0"/>
-              <a:t>A. Follow the schematic and assemble the circuit on each board.</a:t>
-            </a:r>
-          </a:p>
-          <a:p>
-            <a:r>
-              <a:rPr lang="en-US" sz="750" dirty="0"/>
-              <a:t>B. Follow the test method in PART 2 - 2 - 2 to test all the prototypes.</a:t>
+            <a:pPr marL="342900" indent="-342900">
+              <a:buFont typeface="Arial" panose="020B0604020202020204" pitchFamily="34" charset="0"/>
+              <a:buChar char="•"/>
+            </a:pPr>
+            <a:r>
+              <a:rPr lang="en-US" sz="3600" dirty="0" smtClean="0"/>
+              <a:t>Second revision of board (fix board issue)</a:t>
+            </a:r>
+          </a:p>
+          <a:p>
+            <a:pPr marL="342900" indent="-342900">
+              <a:buFont typeface="Arial" panose="020B0604020202020204" pitchFamily="34" charset="0"/>
+              <a:buChar char="•"/>
+            </a:pPr>
+            <a:r>
+              <a:rPr lang="en-US" sz="3600" dirty="0" smtClean="0"/>
+              <a:t>Put it in box – waterproof it</a:t>
+            </a:r>
+          </a:p>
+          <a:p>
+            <a:pPr marL="342900" indent="-342900">
+              <a:buFont typeface="Arial" panose="020B0604020202020204" pitchFamily="34" charset="0"/>
+              <a:buChar char="•"/>
+            </a:pPr>
+            <a:r>
+              <a:rPr lang="en-US" sz="3600" dirty="0" smtClean="0"/>
+              <a:t>More I/O for sensors and plants</a:t>
+            </a:r>
+          </a:p>
+          <a:p>
+            <a:pPr marL="342900" indent="-342900">
+              <a:buFont typeface="Arial" panose="020B0604020202020204" pitchFamily="34" charset="0"/>
+              <a:buChar char="•"/>
+            </a:pPr>
+            <a:r>
+              <a:rPr lang="en-US" sz="3600" dirty="0" smtClean="0"/>
+              <a:t>Keep historical data for seasonal average</a:t>
+            </a:r>
+          </a:p>
+          <a:p>
+            <a:pPr marL="342900" indent="-342900">
+              <a:buFont typeface="Arial" panose="020B0604020202020204" pitchFamily="34" charset="0"/>
+              <a:buChar char="•"/>
+            </a:pPr>
+            <a:r>
+              <a:rPr lang="en-US" sz="3600" dirty="0" smtClean="0"/>
+              <a:t>Add wireless communication for viewable diagnostics and statistics (phone, computer, app)</a:t>
             </a:r>
           </a:p>
         </p:txBody>
@@ -11791,7 +11819,7 @@
     </p:spTree>
     <p:extLst>
       <p:ext uri="{BB962C8B-B14F-4D97-AF65-F5344CB8AC3E}">
-        <p14:creationId xmlns:p14="http://schemas.microsoft.com/office/powerpoint/2010/main" val="246382489"/>
+        <p14:creationId xmlns:p14="http://schemas.microsoft.com/office/powerpoint/2010/main" val="261858471"/>
       </p:ext>
     </p:extLst>
   </p:cSld>
@@ -11837,8 +11865,8 @@
         </p:nvSpPr>
         <p:spPr>
           <a:xfrm>
-            <a:off x="684213" y="685800"/>
-            <a:ext cx="10058400" cy="645695"/>
+            <a:off x="684212" y="685800"/>
+            <a:ext cx="10172209" cy="1558636"/>
           </a:xfrm>
         </p:spPr>
         <p:txBody>
@@ -11848,10 +11876,14 @@
           <a:lstStyle/>
           <a:p>
             <a:r>
-              <a:rPr lang="en-US" sz="6000" dirty="0" smtClean="0"/>
-              <a:t>what’s left to do</a:t>
-            </a:r>
-            <a:endParaRPr lang="en-US" sz="6000" dirty="0"/>
+              <a:rPr lang="en-US" sz="5600" dirty="0" smtClean="0"/>
+              <a:t>Lessons </a:t>
+            </a:r>
+            <a:r>
+              <a:rPr lang="en-US" sz="5600" dirty="0" smtClean="0"/>
+              <a:t>learned</a:t>
+            </a:r>
+            <a:endParaRPr lang="en-US" sz="5600" dirty="0"/>
           </a:p>
         </p:txBody>
       </p:sp>
@@ -11863,8 +11895,8 @@
         </p:nvSpPr>
         <p:spPr>
           <a:xfrm>
-            <a:off x="684213" y="2085473"/>
-            <a:ext cx="10930271" cy="3970318"/>
+            <a:off x="684212" y="2244436"/>
+            <a:ext cx="10930271" cy="3539430"/>
           </a:xfrm>
           <a:prstGeom prst="rect">
             <a:avLst/>
@@ -11882,8 +11914,8 @@
               <a:buChar char="•"/>
             </a:pPr>
             <a:r>
-              <a:rPr lang="en-US" sz="3600" dirty="0" smtClean="0"/>
-              <a:t>Second revision of board (fix board issue)</a:t>
+              <a:rPr lang="en-US" sz="3200" dirty="0" smtClean="0"/>
+              <a:t>Board layout took longer than expected</a:t>
             </a:r>
           </a:p>
           <a:p>
@@ -11892,8 +11924,12 @@
               <a:buChar char="•"/>
             </a:pPr>
             <a:r>
-              <a:rPr lang="en-US" sz="3600" dirty="0" smtClean="0"/>
-              <a:t>Put it in box – waterproof it</a:t>
+              <a:rPr lang="en-US" sz="3200" dirty="0" smtClean="0"/>
+              <a:t>Be careful with discount power </a:t>
+            </a:r>
+            <a:r>
+              <a:rPr lang="en-US" sz="3200" dirty="0" smtClean="0"/>
+              <a:t>supplies</a:t>
             </a:r>
           </a:p>
           <a:p>
@@ -11902,8 +11938,8 @@
               <a:buChar char="•"/>
             </a:pPr>
             <a:r>
-              <a:rPr lang="en-US" sz="3600" dirty="0" smtClean="0"/>
-              <a:t>More I/O for sensors and plants</a:t>
+              <a:rPr lang="en-US" sz="3200" dirty="0" smtClean="0"/>
+              <a:t>No lull time – always stay on top of something</a:t>
             </a:r>
           </a:p>
           <a:p>
@@ -11912,8 +11948,8 @@
               <a:buChar char="•"/>
             </a:pPr>
             <a:r>
-              <a:rPr lang="en-US" sz="3600" dirty="0" smtClean="0"/>
-              <a:t>Keep historical data for seasonal average</a:t>
+              <a:rPr lang="en-US" sz="3200" dirty="0" smtClean="0"/>
+              <a:t>Be careful soldering, we only have four boards</a:t>
             </a:r>
           </a:p>
           <a:p>
@@ -11922,16 +11958,78 @@
               <a:buChar char="•"/>
             </a:pPr>
             <a:r>
-              <a:rPr lang="en-US" sz="3600" dirty="0" smtClean="0"/>
-              <a:t>Add wireless communication for viewable diagnostics and statistics (phone, computer, app)</a:t>
-            </a:r>
+              <a:rPr lang="en-US" sz="3200" dirty="0" smtClean="0"/>
+              <a:t>Can have greater spacing between traces (it’s okay)</a:t>
+            </a:r>
+            <a:endParaRPr lang="en-US" sz="3200" dirty="0" smtClean="0"/>
+          </a:p>
+          <a:p>
+            <a:pPr marL="342900" indent="-342900">
+              <a:buFont typeface="Arial" panose="020B0604020202020204" pitchFamily="34" charset="0"/>
+              <a:buChar char="•"/>
+            </a:pPr>
+            <a:endParaRPr lang="en-US" sz="3200" dirty="0"/>
+          </a:p>
+        </p:txBody>
+      </p:sp>
+      <p:sp>
+        <p:nvSpPr>
+          <p:cNvPr id="3" name="TextBox 2"/>
+          <p:cNvSpPr txBox="1"/>
+          <p:nvPr/>
+        </p:nvSpPr>
+        <p:spPr>
+          <a:xfrm>
+            <a:off x="315884" y="5482245"/>
+            <a:ext cx="3782291" cy="276999"/>
+          </a:xfrm>
+          <a:prstGeom prst="rect">
+            <a:avLst/>
+          </a:prstGeom>
+          <a:noFill/>
+        </p:spPr>
+        <p:txBody>
+          <a:bodyPr wrap="square" rtlCol="0">
+            <a:spAutoFit/>
+          </a:bodyPr>
+          <a:lstStyle/>
+          <a:p>
+            <a:r>
+              <a:rPr lang="en-US" sz="1200" dirty="0" smtClean="0">
+                <a:solidFill>
+                  <a:srgbClr val="136A9C"/>
+                </a:solidFill>
+              </a:rPr>
+              <a:t>Jon </a:t>
+            </a:r>
+            <a:r>
+              <a:rPr lang="en-US" sz="1200" dirty="0" err="1" smtClean="0">
+                <a:solidFill>
+                  <a:srgbClr val="136A9C"/>
+                </a:solidFill>
+              </a:rPr>
+              <a:t>lowkey</a:t>
+            </a:r>
+            <a:r>
+              <a:rPr lang="en-US" sz="1200" dirty="0" smtClean="0">
+                <a:solidFill>
+                  <a:srgbClr val="136A9C"/>
+                </a:solidFill>
+              </a:rPr>
+              <a:t> farts a lot in the lab</a:t>
+            </a:r>
+            <a:endParaRPr lang="en-US" sz="1200" dirty="0">
+              <a:solidFill>
+                <a:srgbClr val="136A9C"/>
+              </a:solidFill>
+            </a:endParaRPr>
           </a:p>
         </p:txBody>
       </p:sp>
     </p:spTree>
     <p:extLst>
       <p:ext uri="{BB962C8B-B14F-4D97-AF65-F5344CB8AC3E}">
-        <p14:creationId xmlns:p14="http://schemas.microsoft.com/office/powerpoint/2010/main" val="261858471"/>
+        <p14:creationId xmlns:p14="http://schemas.microsoft.com/office/powerpoint/2010/main" val="3992406287"/>
       </p:ext>
     </p:extLst>
   </p:cSld>
@@ -11977,8 +12075,8 @@
         </p:nvSpPr>
         <p:spPr>
           <a:xfrm>
-            <a:off x="684212" y="685800"/>
-            <a:ext cx="10172209" cy="1558636"/>
+            <a:off x="684213" y="685800"/>
+            <a:ext cx="10058400" cy="645695"/>
           </a:xfrm>
         </p:spPr>
         <p:txBody>
@@ -11988,10 +12086,10 @@
           <a:lstStyle/>
           <a:p>
             <a:r>
-              <a:rPr lang="en-US" sz="5600" dirty="0" smtClean="0"/>
-              <a:t>Lessons learned as team</a:t>
-            </a:r>
-            <a:endParaRPr lang="en-US" sz="5600" dirty="0"/>
+              <a:rPr lang="en-US" sz="6000" dirty="0" smtClean="0"/>
+              <a:t>IP used</a:t>
+            </a:r>
+            <a:endParaRPr lang="en-US" sz="6000" dirty="0"/>
           </a:p>
         </p:txBody>
       </p:sp>
@@ -12003,8 +12101,8 @@
         </p:nvSpPr>
         <p:spPr>
           <a:xfrm>
-            <a:off x="684212" y="2244436"/>
-            <a:ext cx="10930271" cy="1569660"/>
+            <a:off x="684213" y="2085473"/>
+            <a:ext cx="10930271" cy="3477875"/>
           </a:xfrm>
           <a:prstGeom prst="rect">
             <a:avLst/>
@@ -12022,8 +12120,8 @@
               <a:buChar char="•"/>
             </a:pPr>
             <a:r>
-              <a:rPr lang="en-US" sz="3200" dirty="0" smtClean="0"/>
-              <a:t>Board layout took longer than expected</a:t>
+              <a:rPr lang="en-US" sz="4400" dirty="0" smtClean="0"/>
+              <a:t>Eagle</a:t>
             </a:r>
           </a:p>
           <a:p>
@@ -12032,8 +12130,8 @@
               <a:buChar char="•"/>
             </a:pPr>
             <a:r>
-              <a:rPr lang="en-US" sz="3200" dirty="0" smtClean="0"/>
-              <a:t>Be careful with discount power supplies</a:t>
+              <a:rPr lang="en-US" sz="4400" dirty="0" smtClean="0"/>
+              <a:t>LT Spice</a:t>
             </a:r>
           </a:p>
           <a:p>
@@ -12041,68 +12139,41 @@
               <a:buFont typeface="Arial" panose="020B0604020202020204" pitchFamily="34" charset="0"/>
               <a:buChar char="•"/>
             </a:pPr>
-            <a:endParaRPr lang="en-US" sz="3200" dirty="0"/>
-          </a:p>
-        </p:txBody>
-      </p:sp>
-      <p:sp>
-        <p:nvSpPr>
-          <p:cNvPr id="3" name="TextBox 2"/>
-          <p:cNvSpPr txBox="1"/>
-          <p:nvPr/>
-        </p:nvSpPr>
-        <p:spPr>
-          <a:xfrm>
-            <a:off x="315884" y="5482245"/>
-            <a:ext cx="3782291" cy="276999"/>
-          </a:xfrm>
-          <a:prstGeom prst="rect">
-            <a:avLst/>
-          </a:prstGeom>
-          <a:noFill/>
-        </p:spPr>
-        <p:txBody>
-          <a:bodyPr wrap="square" rtlCol="0">
-            <a:spAutoFit/>
-          </a:bodyPr>
-          <a:lstStyle/>
-          <a:p>
-            <a:r>
-              <a:rPr lang="en-US" sz="1200" dirty="0" smtClean="0">
-                <a:solidFill>
-                  <a:srgbClr val="136A9C"/>
-                </a:solidFill>
+            <a:r>
+              <a:rPr lang="en-US" sz="4400" dirty="0" smtClean="0"/>
+              <a:t>Microsoft Office</a:t>
+            </a:r>
+          </a:p>
+          <a:p>
+            <a:pPr marL="342900" indent="-342900">
+              <a:buFont typeface="Arial" panose="020B0604020202020204" pitchFamily="34" charset="0"/>
+              <a:buChar char="•"/>
+            </a:pPr>
+            <a:r>
+              <a:rPr lang="en-US" sz="4400" smtClean="0">
+                <a:hlinkClick r:id="rId2"/>
               </a:rPr>
-              <a:t>Jon </a:t>
-            </a:r>
-            <a:r>
-              <a:rPr lang="en-US" sz="1200" dirty="0" err="1" smtClean="0">
-                <a:solidFill>
-                  <a:srgbClr val="136A9C"/>
-                </a:solidFill>
-              </a:rPr>
-              <a:t>lowkey</a:t>
-            </a:r>
-            <a:r>
-              <a:rPr lang="en-US" sz="1200" dirty="0" smtClean="0">
-                <a:solidFill>
-                  <a:srgbClr val="136A9C"/>
-                </a:solidFill>
-              </a:rPr>
-              <a:t> farts a lot in the lab</a:t>
-            </a:r>
-            <a:endParaRPr lang="en-US" sz="1200" dirty="0">
-              <a:solidFill>
-                <a:srgbClr val="136A9C"/>
-              </a:solidFill>
-            </a:endParaRPr>
+              <a:t>GitHub</a:t>
+            </a:r>
+            <a:endParaRPr lang="en-US" sz="1600" dirty="0" smtClean="0"/>
+          </a:p>
+          <a:p>
+            <a:pPr marL="342900" indent="-342900">
+              <a:buFont typeface="Arial" panose="020B0604020202020204" pitchFamily="34" charset="0"/>
+              <a:buChar char="•"/>
+            </a:pPr>
+            <a:r>
+              <a:rPr lang="en-US" sz="4400" dirty="0" smtClean="0"/>
+              <a:t>Arduino</a:t>
+            </a:r>
+            <a:endParaRPr lang="en-US" sz="4400" dirty="0"/>
           </a:p>
         </p:txBody>
       </p:sp>
     </p:spTree>
     <p:extLst>
       <p:ext uri="{BB962C8B-B14F-4D97-AF65-F5344CB8AC3E}">
-        <p14:creationId xmlns:p14="http://schemas.microsoft.com/office/powerpoint/2010/main" val="3992406287"/>
+        <p14:creationId xmlns:p14="http://schemas.microsoft.com/office/powerpoint/2010/main" val="139375834"/>
       </p:ext>
     </p:extLst>
   </p:cSld>
@@ -12120,467 +12191,6 @@
 </file>
 
 <file path=ppt/slides/slide2.xml><?xml version="1.0" encoding="utf-8"?>
-<p:sld xmlns:a="http://schemas.openxmlformats.org/drawingml/2006/main" xmlns:r="http://schemas.openxmlformats.org/officeDocument/2006/relationships" xmlns:p="http://schemas.openxmlformats.org/presentationml/2006/main">
-  <p:cSld>
-    <p:spTree>
-      <p:nvGrpSpPr>
-        <p:cNvPr id="1" name=""/>
-        <p:cNvGrpSpPr/>
-        <p:nvPr/>
-      </p:nvGrpSpPr>
-      <p:grpSpPr>
-        <a:xfrm>
-          <a:off x="0" y="0"/>
-          <a:ext cx="0" cy="0"/>
-          <a:chOff x="0" y="0"/>
-          <a:chExt cx="0" cy="0"/>
-        </a:xfrm>
-      </p:grpSpPr>
-      <p:sp>
-        <p:nvSpPr>
-          <p:cNvPr id="4" name="Title 3"/>
-          <p:cNvSpPr>
-            <a:spLocks noGrp="1"/>
-          </p:cNvSpPr>
-          <p:nvPr>
-            <p:ph type="title"/>
-          </p:nvPr>
-        </p:nvSpPr>
-        <p:spPr>
-          <a:xfrm>
-            <a:off x="684213" y="685800"/>
-            <a:ext cx="10058400" cy="645695"/>
-          </a:xfrm>
-        </p:spPr>
-        <p:txBody>
-          <a:bodyPr>
-            <a:noAutofit/>
-          </a:bodyPr>
-          <a:lstStyle/>
-          <a:p>
-            <a:r>
-              <a:rPr lang="en-US" sz="6000" dirty="0" smtClean="0"/>
-              <a:t>Overview of problem </a:t>
-            </a:r>
-            <a:endParaRPr lang="en-US" sz="6000" dirty="0"/>
-          </a:p>
-        </p:txBody>
-      </p:sp>
-      <p:sp>
-        <p:nvSpPr>
-          <p:cNvPr id="7" name="TextBox 6"/>
-          <p:cNvSpPr txBox="1"/>
-          <p:nvPr/>
-        </p:nvSpPr>
-        <p:spPr>
-          <a:xfrm>
-            <a:off x="684213" y="2085473"/>
-            <a:ext cx="10930271" cy="4154984"/>
-          </a:xfrm>
-          <a:prstGeom prst="rect">
-            <a:avLst/>
-          </a:prstGeom>
-          <a:noFill/>
-        </p:spPr>
-        <p:txBody>
-          <a:bodyPr wrap="square" rtlCol="0">
-            <a:spAutoFit/>
-          </a:bodyPr>
-          <a:lstStyle/>
-          <a:p>
-            <a:pPr marL="342900" indent="-342900">
-              <a:buFont typeface="Arial" panose="020B0604020202020204" pitchFamily="34" charset="0"/>
-              <a:buChar char="•"/>
-            </a:pPr>
-            <a:r>
-              <a:rPr lang="en-US" sz="4400" dirty="0" smtClean="0"/>
-              <a:t>Making the home garden watering process more efficient</a:t>
-            </a:r>
-          </a:p>
-          <a:p>
-            <a:pPr marL="342900" indent="-342900">
-              <a:buFont typeface="Arial" panose="020B0604020202020204" pitchFamily="34" charset="0"/>
-              <a:buChar char="•"/>
-            </a:pPr>
-            <a:r>
-              <a:rPr lang="en-US" sz="4400" dirty="0" smtClean="0"/>
-              <a:t>Necessity to water house plants without being present</a:t>
-            </a:r>
-          </a:p>
-          <a:p>
-            <a:pPr marL="342900" indent="-342900">
-              <a:buFont typeface="Arial" panose="020B0604020202020204" pitchFamily="34" charset="0"/>
-              <a:buChar char="•"/>
-            </a:pPr>
-            <a:r>
-              <a:rPr lang="en-US" sz="4400" dirty="0" smtClean="0"/>
-              <a:t>Rethinking water usage</a:t>
-            </a:r>
-          </a:p>
-          <a:p>
-            <a:pPr marL="342900" indent="-342900">
-              <a:buFont typeface="Arial" panose="020B0604020202020204" pitchFamily="34" charset="0"/>
-              <a:buChar char="•"/>
-            </a:pPr>
-            <a:endParaRPr lang="en-US" sz="4400" dirty="0"/>
-          </a:p>
-        </p:txBody>
-      </p:sp>
-    </p:spTree>
-    <p:extLst>
-      <p:ext uri="{BB962C8B-B14F-4D97-AF65-F5344CB8AC3E}">
-        <p14:creationId xmlns:p14="http://schemas.microsoft.com/office/powerpoint/2010/main" val="1111726825"/>
-      </p:ext>
-    </p:extLst>
-  </p:cSld>
-  <p:clrMapOvr>
-    <a:masterClrMapping/>
-  </p:clrMapOvr>
-  <p:timing>
-    <p:tnLst>
-      <p:par>
-        <p:cTn id="1" dur="indefinite" restart="never" nodeType="tmRoot"/>
-      </p:par>
-    </p:tnLst>
-  </p:timing>
-</p:sld>
-</file>
-
-<file path=ppt/slides/slide3.xml><?xml version="1.0" encoding="utf-8"?>
-<p:sld xmlns:a="http://schemas.openxmlformats.org/drawingml/2006/main" xmlns:r="http://schemas.openxmlformats.org/officeDocument/2006/relationships" xmlns:p="http://schemas.openxmlformats.org/presentationml/2006/main">
-  <p:cSld>
-    <p:spTree>
-      <p:nvGrpSpPr>
-        <p:cNvPr id="1" name=""/>
-        <p:cNvGrpSpPr/>
-        <p:nvPr/>
-      </p:nvGrpSpPr>
-      <p:grpSpPr>
-        <a:xfrm>
-          <a:off x="0" y="0"/>
-          <a:ext cx="0" cy="0"/>
-          <a:chOff x="0" y="0"/>
-          <a:chExt cx="0" cy="0"/>
-        </a:xfrm>
-      </p:grpSpPr>
-      <p:sp>
-        <p:nvSpPr>
-          <p:cNvPr id="4" name="Title 3"/>
-          <p:cNvSpPr>
-            <a:spLocks noGrp="1"/>
-          </p:cNvSpPr>
-          <p:nvPr>
-            <p:ph type="title"/>
-          </p:nvPr>
-        </p:nvSpPr>
-        <p:spPr>
-          <a:xfrm>
-            <a:off x="684213" y="685800"/>
-            <a:ext cx="10058400" cy="645695"/>
-          </a:xfrm>
-        </p:spPr>
-        <p:txBody>
-          <a:bodyPr>
-            <a:noAutofit/>
-          </a:bodyPr>
-          <a:lstStyle/>
-          <a:p>
-            <a:r>
-              <a:rPr lang="en-US" sz="6000" dirty="0" smtClean="0"/>
-              <a:t>Solution</a:t>
-            </a:r>
-            <a:endParaRPr lang="en-US" sz="6000" dirty="0"/>
-          </a:p>
-        </p:txBody>
-      </p:sp>
-      <p:sp>
-        <p:nvSpPr>
-          <p:cNvPr id="7" name="TextBox 6"/>
-          <p:cNvSpPr txBox="1"/>
-          <p:nvPr/>
-        </p:nvSpPr>
-        <p:spPr>
-          <a:xfrm>
-            <a:off x="684213" y="2085473"/>
-            <a:ext cx="10930271" cy="4154984"/>
-          </a:xfrm>
-          <a:prstGeom prst="rect">
-            <a:avLst/>
-          </a:prstGeom>
-          <a:noFill/>
-        </p:spPr>
-        <p:txBody>
-          <a:bodyPr wrap="square" rtlCol="0">
-            <a:spAutoFit/>
-          </a:bodyPr>
-          <a:lstStyle/>
-          <a:p>
-            <a:pPr marL="342900" indent="-342900">
-              <a:buFont typeface="Arial" panose="020B0604020202020204" pitchFamily="34" charset="0"/>
-              <a:buChar char="•"/>
-            </a:pPr>
-            <a:r>
-              <a:rPr lang="en-US" sz="4400" dirty="0" smtClean="0"/>
-              <a:t>Self watering plant system</a:t>
-            </a:r>
-          </a:p>
-          <a:p>
-            <a:pPr marL="800100" lvl="1" indent="-342900">
-              <a:buFont typeface="Arial" panose="020B0604020202020204" pitchFamily="34" charset="0"/>
-              <a:buChar char="•"/>
-            </a:pPr>
-            <a:r>
-              <a:rPr lang="en-US" sz="4400" dirty="0" smtClean="0"/>
-              <a:t>Turns on at night</a:t>
-            </a:r>
-          </a:p>
-          <a:p>
-            <a:pPr marL="800100" lvl="1" indent="-342900">
-              <a:buFont typeface="Arial" panose="020B0604020202020204" pitchFamily="34" charset="0"/>
-              <a:buChar char="•"/>
-            </a:pPr>
-            <a:r>
-              <a:rPr lang="en-US" sz="4400" dirty="0" smtClean="0"/>
-              <a:t>Checks moisture level</a:t>
-            </a:r>
-          </a:p>
-          <a:p>
-            <a:pPr marL="800100" lvl="1" indent="-342900">
-              <a:buFont typeface="Arial" panose="020B0604020202020204" pitchFamily="34" charset="0"/>
-              <a:buChar char="•"/>
-            </a:pPr>
-            <a:r>
-              <a:rPr lang="en-US" sz="4400" dirty="0" smtClean="0"/>
-              <a:t>Waters appropriate amount</a:t>
-            </a:r>
-          </a:p>
-          <a:p>
-            <a:pPr marL="800100" lvl="1" indent="-342900">
-              <a:buFont typeface="Arial" panose="020B0604020202020204" pitchFamily="34" charset="0"/>
-              <a:buChar char="•"/>
-            </a:pPr>
-            <a:r>
-              <a:rPr lang="en-US" sz="4400" dirty="0" smtClean="0"/>
-              <a:t>Logs historical data for more accurate watering</a:t>
-            </a:r>
-          </a:p>
-        </p:txBody>
-      </p:sp>
-    </p:spTree>
-    <p:extLst>
-      <p:ext uri="{BB962C8B-B14F-4D97-AF65-F5344CB8AC3E}">
-        <p14:creationId xmlns:p14="http://schemas.microsoft.com/office/powerpoint/2010/main" val="446184131"/>
-      </p:ext>
-    </p:extLst>
-  </p:cSld>
-  <p:clrMapOvr>
-    <a:masterClrMapping/>
-  </p:clrMapOvr>
-  <p:timing>
-    <p:tnLst>
-      <p:par>
-        <p:cTn id="1" dur="indefinite" restart="never" nodeType="tmRoot"/>
-      </p:par>
-    </p:tnLst>
-  </p:timing>
-</p:sld>
-</file>
-
-<file path=ppt/slides/slide4.xml><?xml version="1.0" encoding="utf-8"?>
-<p:sld xmlns:a="http://schemas.openxmlformats.org/drawingml/2006/main" xmlns:r="http://schemas.openxmlformats.org/officeDocument/2006/relationships" xmlns:p="http://schemas.openxmlformats.org/presentationml/2006/main">
-  <p:cSld>
-    <p:spTree>
-      <p:nvGrpSpPr>
-        <p:cNvPr id="1" name=""/>
-        <p:cNvGrpSpPr/>
-        <p:nvPr/>
-      </p:nvGrpSpPr>
-      <p:grpSpPr>
-        <a:xfrm>
-          <a:off x="0" y="0"/>
-          <a:ext cx="0" cy="0"/>
-          <a:chOff x="0" y="0"/>
-          <a:chExt cx="0" cy="0"/>
-        </a:xfrm>
-      </p:grpSpPr>
-      <p:sp>
-        <p:nvSpPr>
-          <p:cNvPr id="4" name="Title 3"/>
-          <p:cNvSpPr>
-            <a:spLocks noGrp="1"/>
-          </p:cNvSpPr>
-          <p:nvPr>
-            <p:ph type="title"/>
-          </p:nvPr>
-        </p:nvSpPr>
-        <p:spPr>
-          <a:xfrm>
-            <a:off x="684213" y="685800"/>
-            <a:ext cx="10058400" cy="645695"/>
-          </a:xfrm>
-        </p:spPr>
-        <p:txBody>
-          <a:bodyPr>
-            <a:noAutofit/>
-          </a:bodyPr>
-          <a:lstStyle/>
-          <a:p>
-            <a:r>
-              <a:rPr lang="en-US" sz="6000" dirty="0" smtClean="0"/>
-              <a:t>Block Diagram level 0</a:t>
-            </a:r>
-            <a:endParaRPr lang="en-US" sz="6000" dirty="0"/>
-          </a:p>
-        </p:txBody>
-      </p:sp>
-      <p:pic>
-        <p:nvPicPr>
-          <p:cNvPr id="3" name="Picture 2"/>
-          <p:cNvPicPr>
-            <a:picLocks noChangeAspect="1"/>
-          </p:cNvPicPr>
-          <p:nvPr/>
-        </p:nvPicPr>
-        <p:blipFill>
-          <a:blip r:embed="rId2">
-            <a:extLst>
-              <a:ext uri="{28A0092B-C50C-407E-A947-70E740481C1C}">
-                <a14:useLocalDpi xmlns:a14="http://schemas.microsoft.com/office/drawing/2010/main" val="0"/>
-              </a:ext>
-            </a:extLst>
-          </a:blip>
-          <a:stretch>
-            <a:fillRect/>
-          </a:stretch>
-        </p:blipFill>
-        <p:spPr>
-          <a:xfrm>
-            <a:off x="1262650" y="2252497"/>
-            <a:ext cx="9783349" cy="3860203"/>
-          </a:xfrm>
-          <a:prstGeom prst="rect">
-            <a:avLst/>
-          </a:prstGeom>
-        </p:spPr>
-      </p:pic>
-    </p:spTree>
-    <p:extLst>
-      <p:ext uri="{BB962C8B-B14F-4D97-AF65-F5344CB8AC3E}">
-        <p14:creationId xmlns:p14="http://schemas.microsoft.com/office/powerpoint/2010/main" val="2481556077"/>
-      </p:ext>
-    </p:extLst>
-  </p:cSld>
-  <p:clrMapOvr>
-    <a:masterClrMapping/>
-  </p:clrMapOvr>
-  <p:timing>
-    <p:tnLst>
-      <p:par>
-        <p:cTn id="1" dur="indefinite" restart="never" nodeType="tmRoot"/>
-      </p:par>
-    </p:tnLst>
-  </p:timing>
-</p:sld>
-</file>
-
-<file path=ppt/slides/slide5.xml><?xml version="1.0" encoding="utf-8"?>
-<p:sld xmlns:a="http://schemas.openxmlformats.org/drawingml/2006/main" xmlns:r="http://schemas.openxmlformats.org/officeDocument/2006/relationships" xmlns:p="http://schemas.openxmlformats.org/presentationml/2006/main">
-  <p:cSld>
-    <p:spTree>
-      <p:nvGrpSpPr>
-        <p:cNvPr id="1" name=""/>
-        <p:cNvGrpSpPr/>
-        <p:nvPr/>
-      </p:nvGrpSpPr>
-      <p:grpSpPr>
-        <a:xfrm>
-          <a:off x="0" y="0"/>
-          <a:ext cx="0" cy="0"/>
-          <a:chOff x="0" y="0"/>
-          <a:chExt cx="0" cy="0"/>
-        </a:xfrm>
-      </p:grpSpPr>
-      <p:sp>
-        <p:nvSpPr>
-          <p:cNvPr id="4" name="Title 3"/>
-          <p:cNvSpPr>
-            <a:spLocks noGrp="1"/>
-          </p:cNvSpPr>
-          <p:nvPr>
-            <p:ph type="title"/>
-          </p:nvPr>
-        </p:nvSpPr>
-        <p:spPr>
-          <a:xfrm>
-            <a:off x="684213" y="685800"/>
-            <a:ext cx="10058400" cy="645695"/>
-          </a:xfrm>
-        </p:spPr>
-        <p:txBody>
-          <a:bodyPr>
-            <a:noAutofit/>
-          </a:bodyPr>
-          <a:lstStyle/>
-          <a:p>
-            <a:r>
-              <a:rPr lang="en-US" sz="6000" dirty="0" smtClean="0"/>
-              <a:t>Block diagram level 1</a:t>
-            </a:r>
-            <a:endParaRPr lang="en-US" sz="6000" dirty="0"/>
-          </a:p>
-        </p:txBody>
-      </p:sp>
-      <p:pic>
-        <p:nvPicPr>
-          <p:cNvPr id="2" name="Picture 1"/>
-          <p:cNvPicPr>
-            <a:picLocks noChangeAspect="1"/>
-          </p:cNvPicPr>
-          <p:nvPr/>
-        </p:nvPicPr>
-        <p:blipFill>
-          <a:blip r:embed="rId2">
-            <a:extLst>
-              <a:ext uri="{28A0092B-C50C-407E-A947-70E740481C1C}">
-                <a14:useLocalDpi xmlns:a14="http://schemas.microsoft.com/office/drawing/2010/main" val="0"/>
-              </a:ext>
-            </a:extLst>
-          </a:blip>
-          <a:stretch>
-            <a:fillRect/>
-          </a:stretch>
-        </p:blipFill>
-        <p:spPr>
-          <a:xfrm>
-            <a:off x="1113609" y="1694712"/>
-            <a:ext cx="9199608" cy="4882551"/>
-          </a:xfrm>
-          <a:prstGeom prst="rect">
-            <a:avLst/>
-          </a:prstGeom>
-        </p:spPr>
-      </p:pic>
-    </p:spTree>
-    <p:extLst>
-      <p:ext uri="{BB962C8B-B14F-4D97-AF65-F5344CB8AC3E}">
-        <p14:creationId xmlns:p14="http://schemas.microsoft.com/office/powerpoint/2010/main" val="2375352249"/>
-      </p:ext>
-    </p:extLst>
-  </p:cSld>
-  <p:clrMapOvr>
-    <a:masterClrMapping/>
-  </p:clrMapOvr>
-  <p:timing>
-    <p:tnLst>
-      <p:par>
-        <p:cTn id="1" dur="indefinite" restart="never" nodeType="tmRoot"/>
-      </p:par>
-    </p:tnLst>
-  </p:timing>
-</p:sld>
-</file>
-
-<file path=ppt/slides/slide6.xml><?xml version="1.0" encoding="utf-8"?>
 <p:sld xmlns:a="http://schemas.openxmlformats.org/drawingml/2006/main" xmlns:r="http://schemas.openxmlformats.org/officeDocument/2006/relationships" xmlns:p="http://schemas.openxmlformats.org/presentationml/2006/main">
   <p:cSld>
     <p:spTree>
@@ -12737,12 +12347,12 @@
                     <a:p>
                       <a:pPr algn="l" fontAlgn="b"/>
                       <a:r>
-                        <a:rPr lang="en-US" sz="2000" u="none" strike="noStrike">
+                        <a:rPr lang="en-US" sz="2000" u="none" strike="noStrike" dirty="0">
                           <a:effectLst/>
                         </a:rPr>
                         <a:t>Magnetic Gripper</a:t>
                       </a:r>
-                      <a:endParaRPr lang="en-US" sz="2000" b="1" i="0" u="none" strike="noStrike">
+                      <a:endParaRPr lang="en-US" sz="2000" b="1" i="0" u="none" strike="noStrike" dirty="0">
                         <a:solidFill>
                           <a:srgbClr val="000000"/>
                         </a:solidFill>
@@ -12882,12 +12492,12 @@
                     <a:p>
                       <a:pPr algn="ctr" fontAlgn="b"/>
                       <a:r>
-                        <a:rPr lang="en-US" sz="2000" u="none" strike="noStrike">
+                        <a:rPr lang="en-US" sz="2000" u="none" strike="noStrike" dirty="0">
                           <a:effectLst/>
                         </a:rPr>
                         <a:t>1</a:t>
                       </a:r>
-                      <a:endParaRPr lang="en-US" sz="2000" b="0" i="0" u="none" strike="noStrike">
+                      <a:endParaRPr lang="en-US" sz="2000" b="0" i="0" u="none" strike="noStrike" dirty="0">
                         <a:solidFill>
                           <a:srgbClr val="000000"/>
                         </a:solidFill>
@@ -13845,6 +13455,522 @@
     <p:extLst>
       <p:ext uri="{BB962C8B-B14F-4D97-AF65-F5344CB8AC3E}">
         <p14:creationId xmlns:p14="http://schemas.microsoft.com/office/powerpoint/2010/main" val="382832918"/>
+      </p:ext>
+    </p:extLst>
+  </p:cSld>
+  <p:clrMapOvr>
+    <a:masterClrMapping/>
+  </p:clrMapOvr>
+  <p:timing>
+    <p:tnLst>
+      <p:par>
+        <p:cTn id="1" dur="indefinite" restart="never" nodeType="tmRoot"/>
+      </p:par>
+    </p:tnLst>
+  </p:timing>
+</p:sld>
+</file>
+
+<file path=ppt/slides/slide3.xml><?xml version="1.0" encoding="utf-8"?>
+<p:sld xmlns:a="http://schemas.openxmlformats.org/drawingml/2006/main" xmlns:r="http://schemas.openxmlformats.org/officeDocument/2006/relationships" xmlns:p="http://schemas.openxmlformats.org/presentationml/2006/main">
+  <p:cSld>
+    <p:spTree>
+      <p:nvGrpSpPr>
+        <p:cNvPr id="1" name=""/>
+        <p:cNvGrpSpPr/>
+        <p:nvPr/>
+      </p:nvGrpSpPr>
+      <p:grpSpPr>
+        <a:xfrm>
+          <a:off x="0" y="0"/>
+          <a:ext cx="0" cy="0"/>
+          <a:chOff x="0" y="0"/>
+          <a:chExt cx="0" cy="0"/>
+        </a:xfrm>
+      </p:grpSpPr>
+      <p:sp>
+        <p:nvSpPr>
+          <p:cNvPr id="4" name="Title 3"/>
+          <p:cNvSpPr>
+            <a:spLocks noGrp="1"/>
+          </p:cNvSpPr>
+          <p:nvPr>
+            <p:ph type="title"/>
+          </p:nvPr>
+        </p:nvSpPr>
+        <p:spPr>
+          <a:xfrm>
+            <a:off x="684213" y="685800"/>
+            <a:ext cx="10058400" cy="645695"/>
+          </a:xfrm>
+        </p:spPr>
+        <p:txBody>
+          <a:bodyPr>
+            <a:noAutofit/>
+          </a:bodyPr>
+          <a:lstStyle/>
+          <a:p>
+            <a:r>
+              <a:rPr lang="en-US" sz="6000" dirty="0" smtClean="0"/>
+              <a:t>Overview of problem </a:t>
+            </a:r>
+            <a:endParaRPr lang="en-US" sz="6000" dirty="0"/>
+          </a:p>
+        </p:txBody>
+      </p:sp>
+      <p:sp>
+        <p:nvSpPr>
+          <p:cNvPr id="7" name="TextBox 6"/>
+          <p:cNvSpPr txBox="1"/>
+          <p:nvPr/>
+        </p:nvSpPr>
+        <p:spPr>
+          <a:xfrm>
+            <a:off x="684213" y="2085473"/>
+            <a:ext cx="10930271" cy="4154984"/>
+          </a:xfrm>
+          <a:prstGeom prst="rect">
+            <a:avLst/>
+          </a:prstGeom>
+          <a:noFill/>
+        </p:spPr>
+        <p:txBody>
+          <a:bodyPr wrap="square" rtlCol="0">
+            <a:spAutoFit/>
+          </a:bodyPr>
+          <a:lstStyle/>
+          <a:p>
+            <a:pPr marL="342900" indent="-342900">
+              <a:buFont typeface="Arial" panose="020B0604020202020204" pitchFamily="34" charset="0"/>
+              <a:buChar char="•"/>
+            </a:pPr>
+            <a:r>
+              <a:rPr lang="en-US" sz="4400" dirty="0" smtClean="0"/>
+              <a:t>Making the home garden watering process more efficient</a:t>
+            </a:r>
+          </a:p>
+          <a:p>
+            <a:pPr marL="342900" indent="-342900">
+              <a:buFont typeface="Arial" panose="020B0604020202020204" pitchFamily="34" charset="0"/>
+              <a:buChar char="•"/>
+            </a:pPr>
+            <a:r>
+              <a:rPr lang="en-US" sz="4400" dirty="0" smtClean="0"/>
+              <a:t>Necessity to water house plants without being present</a:t>
+            </a:r>
+          </a:p>
+          <a:p>
+            <a:pPr marL="342900" indent="-342900">
+              <a:buFont typeface="Arial" panose="020B0604020202020204" pitchFamily="34" charset="0"/>
+              <a:buChar char="•"/>
+            </a:pPr>
+            <a:r>
+              <a:rPr lang="en-US" sz="4400" dirty="0" smtClean="0"/>
+              <a:t>Rethinking water usage</a:t>
+            </a:r>
+          </a:p>
+          <a:p>
+            <a:pPr marL="342900" indent="-342900">
+              <a:buFont typeface="Arial" panose="020B0604020202020204" pitchFamily="34" charset="0"/>
+              <a:buChar char="•"/>
+            </a:pPr>
+            <a:endParaRPr lang="en-US" sz="4400" dirty="0"/>
+          </a:p>
+        </p:txBody>
+      </p:sp>
+    </p:spTree>
+    <p:extLst>
+      <p:ext uri="{BB962C8B-B14F-4D97-AF65-F5344CB8AC3E}">
+        <p14:creationId xmlns:p14="http://schemas.microsoft.com/office/powerpoint/2010/main" val="1111726825"/>
+      </p:ext>
+    </p:extLst>
+  </p:cSld>
+  <p:clrMapOvr>
+    <a:masterClrMapping/>
+  </p:clrMapOvr>
+  <p:timing>
+    <p:tnLst>
+      <p:par>
+        <p:cTn id="1" dur="indefinite" restart="never" nodeType="tmRoot"/>
+      </p:par>
+    </p:tnLst>
+  </p:timing>
+</p:sld>
+</file>
+
+<file path=ppt/slides/slide4.xml><?xml version="1.0" encoding="utf-8"?>
+<p:sld xmlns:a="http://schemas.openxmlformats.org/drawingml/2006/main" xmlns:r="http://schemas.openxmlformats.org/officeDocument/2006/relationships" xmlns:p="http://schemas.openxmlformats.org/presentationml/2006/main">
+  <p:cSld>
+    <p:spTree>
+      <p:nvGrpSpPr>
+        <p:cNvPr id="1" name=""/>
+        <p:cNvGrpSpPr/>
+        <p:nvPr/>
+      </p:nvGrpSpPr>
+      <p:grpSpPr>
+        <a:xfrm>
+          <a:off x="0" y="0"/>
+          <a:ext cx="0" cy="0"/>
+          <a:chOff x="0" y="0"/>
+          <a:chExt cx="0" cy="0"/>
+        </a:xfrm>
+      </p:grpSpPr>
+      <p:sp>
+        <p:nvSpPr>
+          <p:cNvPr id="4" name="Title 3"/>
+          <p:cNvSpPr>
+            <a:spLocks noGrp="1"/>
+          </p:cNvSpPr>
+          <p:nvPr>
+            <p:ph type="title"/>
+          </p:nvPr>
+        </p:nvSpPr>
+        <p:spPr>
+          <a:xfrm>
+            <a:off x="684213" y="685800"/>
+            <a:ext cx="10058400" cy="645695"/>
+          </a:xfrm>
+        </p:spPr>
+        <p:txBody>
+          <a:bodyPr>
+            <a:noAutofit/>
+          </a:bodyPr>
+          <a:lstStyle/>
+          <a:p>
+            <a:r>
+              <a:rPr lang="en-US" sz="6000" dirty="0" smtClean="0"/>
+              <a:t>Solution</a:t>
+            </a:r>
+            <a:endParaRPr lang="en-US" sz="6000" dirty="0"/>
+          </a:p>
+        </p:txBody>
+      </p:sp>
+      <p:sp>
+        <p:nvSpPr>
+          <p:cNvPr id="7" name="TextBox 6"/>
+          <p:cNvSpPr txBox="1"/>
+          <p:nvPr/>
+        </p:nvSpPr>
+        <p:spPr>
+          <a:xfrm>
+            <a:off x="684213" y="2085473"/>
+            <a:ext cx="10930271" cy="3170099"/>
+          </a:xfrm>
+          <a:prstGeom prst="rect">
+            <a:avLst/>
+          </a:prstGeom>
+          <a:noFill/>
+        </p:spPr>
+        <p:txBody>
+          <a:bodyPr wrap="square" rtlCol="0">
+            <a:spAutoFit/>
+          </a:bodyPr>
+          <a:lstStyle/>
+          <a:p>
+            <a:pPr marL="342900" indent="-342900">
+              <a:buFont typeface="Arial" panose="020B0604020202020204" pitchFamily="34" charset="0"/>
+              <a:buChar char="•"/>
+            </a:pPr>
+            <a:r>
+              <a:rPr lang="en-US" sz="4000" dirty="0" smtClean="0"/>
+              <a:t>Self watering plant </a:t>
+            </a:r>
+            <a:r>
+              <a:rPr lang="en-US" sz="4000" dirty="0" smtClean="0"/>
+              <a:t>system</a:t>
+            </a:r>
+          </a:p>
+          <a:p>
+            <a:pPr marL="800100" lvl="1" indent="-342900">
+              <a:buFont typeface="Arial" panose="020B0604020202020204" pitchFamily="34" charset="0"/>
+              <a:buChar char="•"/>
+            </a:pPr>
+            <a:r>
+              <a:rPr lang="en-US" sz="4000" dirty="0" smtClean="0"/>
+              <a:t>Periodically checks moisture level</a:t>
+            </a:r>
+            <a:endParaRPr lang="en-US" sz="4000" dirty="0" smtClean="0"/>
+          </a:p>
+          <a:p>
+            <a:pPr marL="800100" lvl="1" indent="-342900">
+              <a:buFont typeface="Arial" panose="020B0604020202020204" pitchFamily="34" charset="0"/>
+              <a:buChar char="•"/>
+            </a:pPr>
+            <a:r>
+              <a:rPr lang="en-US" sz="4000" dirty="0" smtClean="0"/>
+              <a:t>Turns </a:t>
+            </a:r>
+            <a:r>
+              <a:rPr lang="en-US" sz="4000" dirty="0" smtClean="0"/>
+              <a:t>on when moisture level out of bounds</a:t>
+            </a:r>
+            <a:endParaRPr lang="en-US" sz="4000" dirty="0" smtClean="0"/>
+          </a:p>
+          <a:p>
+            <a:pPr marL="800100" lvl="1" indent="-342900">
+              <a:buFont typeface="Arial" panose="020B0604020202020204" pitchFamily="34" charset="0"/>
+              <a:buChar char="•"/>
+            </a:pPr>
+            <a:r>
+              <a:rPr lang="en-US" sz="4000" dirty="0" smtClean="0"/>
+              <a:t>Waters </a:t>
+            </a:r>
+            <a:r>
+              <a:rPr lang="en-US" sz="4000" dirty="0" smtClean="0"/>
+              <a:t>appropriate </a:t>
+            </a:r>
+            <a:r>
+              <a:rPr lang="en-US" sz="4000" dirty="0" smtClean="0"/>
+              <a:t>amount</a:t>
+            </a:r>
+            <a:endParaRPr lang="en-US" sz="4000" dirty="0" smtClean="0"/>
+          </a:p>
+        </p:txBody>
+      </p:sp>
+    </p:spTree>
+    <p:extLst>
+      <p:ext uri="{BB962C8B-B14F-4D97-AF65-F5344CB8AC3E}">
+        <p14:creationId xmlns:p14="http://schemas.microsoft.com/office/powerpoint/2010/main" val="446184131"/>
+      </p:ext>
+    </p:extLst>
+  </p:cSld>
+  <p:clrMapOvr>
+    <a:masterClrMapping/>
+  </p:clrMapOvr>
+  <p:timing>
+    <p:tnLst>
+      <p:par>
+        <p:cTn id="1" dur="indefinite" restart="never" nodeType="tmRoot"/>
+      </p:par>
+    </p:tnLst>
+  </p:timing>
+</p:sld>
+</file>
+
+<file path=ppt/slides/slide5.xml><?xml version="1.0" encoding="utf-8"?>
+<p:sld xmlns:a="http://schemas.openxmlformats.org/drawingml/2006/main" xmlns:r="http://schemas.openxmlformats.org/officeDocument/2006/relationships" xmlns:p="http://schemas.openxmlformats.org/presentationml/2006/main">
+  <p:cSld>
+    <p:spTree>
+      <p:nvGrpSpPr>
+        <p:cNvPr id="1" name=""/>
+        <p:cNvGrpSpPr/>
+        <p:nvPr/>
+      </p:nvGrpSpPr>
+      <p:grpSpPr>
+        <a:xfrm>
+          <a:off x="0" y="0"/>
+          <a:ext cx="0" cy="0"/>
+          <a:chOff x="0" y="0"/>
+          <a:chExt cx="0" cy="0"/>
+        </a:xfrm>
+      </p:grpSpPr>
+      <p:sp>
+        <p:nvSpPr>
+          <p:cNvPr id="4" name="Title 3"/>
+          <p:cNvSpPr>
+            <a:spLocks noGrp="1"/>
+          </p:cNvSpPr>
+          <p:nvPr>
+            <p:ph type="title"/>
+          </p:nvPr>
+        </p:nvSpPr>
+        <p:spPr>
+          <a:xfrm>
+            <a:off x="684213" y="685800"/>
+            <a:ext cx="10058400" cy="645695"/>
+          </a:xfrm>
+        </p:spPr>
+        <p:txBody>
+          <a:bodyPr>
+            <a:noAutofit/>
+          </a:bodyPr>
+          <a:lstStyle/>
+          <a:p>
+            <a:r>
+              <a:rPr lang="en-US" sz="6000" dirty="0" smtClean="0"/>
+              <a:t>Block Diagram level 0</a:t>
+            </a:r>
+            <a:endParaRPr lang="en-US" sz="6000" dirty="0"/>
+          </a:p>
+        </p:txBody>
+      </p:sp>
+      <p:pic>
+        <p:nvPicPr>
+          <p:cNvPr id="3" name="Picture 2"/>
+          <p:cNvPicPr>
+            <a:picLocks noChangeAspect="1"/>
+          </p:cNvPicPr>
+          <p:nvPr/>
+        </p:nvPicPr>
+        <p:blipFill>
+          <a:blip r:embed="rId2">
+            <a:extLst>
+              <a:ext uri="{28A0092B-C50C-407E-A947-70E740481C1C}">
+                <a14:useLocalDpi xmlns:a14="http://schemas.microsoft.com/office/drawing/2010/main" val="0"/>
+              </a:ext>
+            </a:extLst>
+          </a:blip>
+          <a:stretch>
+            <a:fillRect/>
+          </a:stretch>
+        </p:blipFill>
+        <p:spPr>
+          <a:xfrm>
+            <a:off x="1262650" y="2252497"/>
+            <a:ext cx="9783349" cy="3860203"/>
+          </a:xfrm>
+          <a:prstGeom prst="rect">
+            <a:avLst/>
+          </a:prstGeom>
+        </p:spPr>
+      </p:pic>
+      <p:sp>
+        <p:nvSpPr>
+          <p:cNvPr id="2" name="TextBox 1"/>
+          <p:cNvSpPr txBox="1"/>
+          <p:nvPr/>
+        </p:nvSpPr>
+        <p:spPr>
+          <a:xfrm>
+            <a:off x="1737361" y="4763191"/>
+            <a:ext cx="872836" cy="369332"/>
+          </a:xfrm>
+          <a:prstGeom prst="rect">
+            <a:avLst/>
+          </a:prstGeom>
+          <a:solidFill>
+            <a:schemeClr val="tx1"/>
+          </a:solidFill>
+        </p:spPr>
+        <p:txBody>
+          <a:bodyPr wrap="square" rtlCol="0">
+            <a:spAutoFit/>
+          </a:bodyPr>
+          <a:lstStyle/>
+          <a:p>
+            <a:r>
+              <a:rPr lang="en-US" b="1" dirty="0" smtClean="0">
+                <a:solidFill>
+                  <a:schemeClr val="bg1">
+                    <a:lumMod val="95000"/>
+                    <a:lumOff val="5000"/>
+                  </a:schemeClr>
+                </a:solidFill>
+              </a:rPr>
+              <a:t>V DC</a:t>
+            </a:r>
+            <a:endParaRPr lang="en-US" b="1" dirty="0">
+              <a:solidFill>
+                <a:schemeClr val="bg1">
+                  <a:lumMod val="95000"/>
+                  <a:lumOff val="5000"/>
+                </a:schemeClr>
+              </a:solidFill>
+            </a:endParaRPr>
+          </a:p>
+        </p:txBody>
+      </p:sp>
+    </p:spTree>
+    <p:extLst>
+      <p:ext uri="{BB962C8B-B14F-4D97-AF65-F5344CB8AC3E}">
+        <p14:creationId xmlns:p14="http://schemas.microsoft.com/office/powerpoint/2010/main" val="2481556077"/>
+      </p:ext>
+    </p:extLst>
+  </p:cSld>
+  <p:clrMapOvr>
+    <a:masterClrMapping/>
+  </p:clrMapOvr>
+  <p:timing>
+    <p:tnLst>
+      <p:par>
+        <p:cTn id="1" dur="indefinite" restart="never" nodeType="tmRoot"/>
+      </p:par>
+    </p:tnLst>
+  </p:timing>
+</p:sld>
+</file>
+
+<file path=ppt/slides/slide6.xml><?xml version="1.0" encoding="utf-8"?>
+<p:sld xmlns:a="http://schemas.openxmlformats.org/drawingml/2006/main" xmlns:r="http://schemas.openxmlformats.org/officeDocument/2006/relationships" xmlns:p="http://schemas.openxmlformats.org/presentationml/2006/main">
+  <p:cSld>
+    <p:spTree>
+      <p:nvGrpSpPr>
+        <p:cNvPr id="1" name=""/>
+        <p:cNvGrpSpPr/>
+        <p:nvPr/>
+      </p:nvGrpSpPr>
+      <p:grpSpPr>
+        <a:xfrm>
+          <a:off x="0" y="0"/>
+          <a:ext cx="0" cy="0"/>
+          <a:chOff x="0" y="0"/>
+          <a:chExt cx="0" cy="0"/>
+        </a:xfrm>
+      </p:grpSpPr>
+      <p:sp>
+        <p:nvSpPr>
+          <p:cNvPr id="4" name="Title 3"/>
+          <p:cNvSpPr>
+            <a:spLocks noGrp="1"/>
+          </p:cNvSpPr>
+          <p:nvPr>
+            <p:ph type="title"/>
+          </p:nvPr>
+        </p:nvSpPr>
+        <p:spPr>
+          <a:xfrm>
+            <a:off x="684213" y="685800"/>
+            <a:ext cx="10058400" cy="645695"/>
+          </a:xfrm>
+        </p:spPr>
+        <p:txBody>
+          <a:bodyPr>
+            <a:noAutofit/>
+          </a:bodyPr>
+          <a:lstStyle/>
+          <a:p>
+            <a:r>
+              <a:rPr lang="en-US" sz="6000" dirty="0" smtClean="0"/>
+              <a:t>Block diagram level 1</a:t>
+            </a:r>
+            <a:endParaRPr lang="en-US" sz="6000" dirty="0"/>
+          </a:p>
+        </p:txBody>
+      </p:sp>
+      <p:pic>
+        <p:nvPicPr>
+          <p:cNvPr id="3" name="Picture 2"/>
+          <p:cNvPicPr>
+            <a:picLocks noChangeAspect="1"/>
+          </p:cNvPicPr>
+          <p:nvPr/>
+        </p:nvPicPr>
+        <p:blipFill>
+          <a:blip r:embed="rId2">
+            <a:extLst>
+              <a:ext uri="{28A0092B-C50C-407E-A947-70E740481C1C}">
+                <a14:useLocalDpi xmlns:a14="http://schemas.microsoft.com/office/drawing/2010/main" val="0"/>
+              </a:ext>
+            </a:extLst>
+          </a:blip>
+          <a:stretch>
+            <a:fillRect/>
+          </a:stretch>
+        </p:blipFill>
+        <p:spPr>
+          <a:xfrm>
+            <a:off x="2298223" y="1733404"/>
+            <a:ext cx="7317515" cy="3561803"/>
+          </a:xfrm>
+          <a:prstGeom prst="rect">
+            <a:avLst/>
+          </a:prstGeom>
+        </p:spPr>
+      </p:pic>
+    </p:spTree>
+    <p:extLst>
+      <p:ext uri="{BB962C8B-B14F-4D97-AF65-F5344CB8AC3E}">
+        <p14:creationId xmlns:p14="http://schemas.microsoft.com/office/powerpoint/2010/main" val="2375352249"/>
       </p:ext>
     </p:extLst>
   </p:cSld>
@@ -14114,23 +14240,39 @@
             </a:r>
           </a:p>
           <a:p>
-            <a:pPr marL="1943100" lvl="3" indent="-571500">
-              <a:buFont typeface="Arial" panose="020B0604020202020204" pitchFamily="34" charset="0"/>
-              <a:buChar char="•"/>
-            </a:pPr>
-            <a:r>
-              <a:rPr lang="en-US" sz="2800" dirty="0" smtClean="0"/>
-              <a:t>Time specified by potentiometer (between 5 and 30 seconds)</a:t>
-            </a:r>
-          </a:p>
-          <a:p>
             <a:pPr marL="1028700" lvl="1" indent="-571500">
               <a:buFont typeface="Arial" panose="020B0604020202020204" pitchFamily="34" charset="0"/>
               <a:buChar char="•"/>
             </a:pPr>
             <a:r>
+              <a:rPr lang="en-US" sz="2800" dirty="0" err="1" smtClean="0"/>
+              <a:t>VerificTime</a:t>
+            </a:r>
+            <a:r>
               <a:rPr lang="en-US" sz="2800" dirty="0" smtClean="0"/>
-              <a:t>Verification of hardware via </a:t>
+              <a:t> </a:t>
+            </a:r>
+            <a:r>
+              <a:rPr lang="en-US" sz="2800" dirty="0"/>
+              <a:t>specified by potentiometer (between 5 and 30 seconds)</a:t>
+            </a:r>
+          </a:p>
+          <a:p>
+            <a:pPr marL="1028700" lvl="1" indent="-571500">
+              <a:buFont typeface="Arial" panose="020B0604020202020204" pitchFamily="34" charset="0"/>
+              <a:buChar char="•"/>
+            </a:pPr>
+            <a:r>
+              <a:rPr lang="en-US" sz="2800" dirty="0" err="1" smtClean="0"/>
+              <a:t>ation</a:t>
+            </a:r>
+            <a:r>
+              <a:rPr lang="en-US" sz="2800" dirty="0" smtClean="0"/>
+              <a:t> </a:t>
+            </a:r>
+            <a:r>
+              <a:rPr lang="en-US" sz="2800" dirty="0" smtClean="0"/>
+              <a:t>of hardware via </a:t>
             </a:r>
             <a:r>
               <a:rPr lang="en-US" sz="2800" dirty="0" err="1" smtClean="0"/>

</xml_diff>

<commit_message>
Finalized presentation with gantt chart
</commit_message>
<xml_diff>
--- a/documents/presentation.pptx
+++ b/documents/presentation.pptx
@@ -18,8 +18,9 @@
     <p:sldId id="268" r:id="rId12"/>
     <p:sldId id="270" r:id="rId13"/>
     <p:sldId id="271" r:id="rId14"/>
-    <p:sldId id="272" r:id="rId15"/>
-    <p:sldId id="266" r:id="rId16"/>
+    <p:sldId id="273" r:id="rId15"/>
+    <p:sldId id="272" r:id="rId16"/>
+    <p:sldId id="266" r:id="rId17"/>
   </p:sldIdLst>
   <p:sldSz cx="12192000" cy="6858000"/>
   <p:notesSz cx="6858000" cy="9144000"/>
@@ -11855,6 +11856,181 @@
       </p:grpSpPr>
       <p:sp>
         <p:nvSpPr>
+          <p:cNvPr id="3" name="Rectangle 2"/>
+          <p:cNvSpPr/>
+          <p:nvPr/>
+        </p:nvSpPr>
+        <p:spPr>
+          <a:xfrm>
+            <a:off x="473825" y="1778924"/>
+            <a:ext cx="11629506" cy="3399905"/>
+          </a:xfrm>
+          <a:prstGeom prst="rect">
+            <a:avLst/>
+          </a:prstGeom>
+          <a:solidFill>
+            <a:schemeClr val="tx1"/>
+          </a:solidFill>
+        </p:spPr>
+        <p:style>
+          <a:lnRef idx="2">
+            <a:schemeClr val="accent1">
+              <a:shade val="50000"/>
+            </a:schemeClr>
+          </a:lnRef>
+          <a:fillRef idx="1">
+            <a:schemeClr val="accent1"/>
+          </a:fillRef>
+          <a:effectRef idx="0">
+            <a:schemeClr val="accent1"/>
+          </a:effectRef>
+          <a:fontRef idx="minor">
+            <a:schemeClr val="lt1"/>
+          </a:fontRef>
+        </p:style>
+        <p:txBody>
+          <a:bodyPr rtlCol="0" anchor="ctr"/>
+          <a:lstStyle/>
+          <a:p>
+            <a:pPr algn="ctr"/>
+            <a:endParaRPr lang="en-US"/>
+          </a:p>
+        </p:txBody>
+      </p:sp>
+      <p:sp>
+        <p:nvSpPr>
+          <p:cNvPr id="4" name="Title 3"/>
+          <p:cNvSpPr>
+            <a:spLocks noGrp="1"/>
+          </p:cNvSpPr>
+          <p:nvPr>
+            <p:ph type="title"/>
+          </p:nvPr>
+        </p:nvSpPr>
+        <p:spPr>
+          <a:xfrm>
+            <a:off x="684213" y="685800"/>
+            <a:ext cx="10058400" cy="645695"/>
+          </a:xfrm>
+        </p:spPr>
+        <p:txBody>
+          <a:bodyPr>
+            <a:noAutofit/>
+          </a:bodyPr>
+          <a:lstStyle/>
+          <a:p>
+            <a:r>
+              <a:rPr lang="en-US" sz="6000" dirty="0" smtClean="0"/>
+              <a:t>Finalized </a:t>
+            </a:r>
+            <a:r>
+              <a:rPr lang="en-US" sz="6000" dirty="0" err="1" smtClean="0"/>
+              <a:t>gantt</a:t>
+            </a:r>
+            <a:r>
+              <a:rPr lang="en-US" sz="6000" dirty="0" smtClean="0"/>
+              <a:t> chart</a:t>
+            </a:r>
+            <a:endParaRPr lang="en-US" sz="6000" dirty="0"/>
+          </a:p>
+        </p:txBody>
+      </p:sp>
+      <p:graphicFrame>
+        <p:nvGraphicFramePr>
+          <p:cNvPr id="2" name="Object 1"/>
+          <p:cNvGraphicFramePr>
+            <a:graphicFrameLocks noChangeAspect="1"/>
+          </p:cNvGraphicFramePr>
+          <p:nvPr>
+            <p:extLst>
+              <p:ext uri="{D42A27DB-BD31-4B8C-83A1-F6EECF244321}">
+                <p14:modId xmlns:p14="http://schemas.microsoft.com/office/powerpoint/2010/main" val="121927459"/>
+              </p:ext>
+            </p:extLst>
+          </p:nvPr>
+        </p:nvGraphicFramePr>
+        <p:xfrm>
+          <a:off x="534804" y="1936865"/>
+          <a:ext cx="11302283" cy="2909455"/>
+        </p:xfrm>
+        <a:graphic>
+          <a:graphicData uri="http://schemas.openxmlformats.org/presentationml/2006/ole">
+            <mc:AlternateContent xmlns:mc="http://schemas.openxmlformats.org/markup-compatibility/2006">
+              <mc:Choice xmlns:v="urn:schemas-microsoft-com:vml" Requires="v">
+                <p:oleObj spid="_x0000_s1029" name="Worksheet" r:id="rId3" imgW="18459383" imgH="4752882" progId="Excel.Sheet.12">
+                  <p:embed/>
+                </p:oleObj>
+              </mc:Choice>
+              <mc:Fallback>
+                <p:oleObj name="Worksheet" r:id="rId3" imgW="18459383" imgH="4752882" progId="Excel.Sheet.12">
+                  <p:embed/>
+                  <p:pic>
+                    <p:nvPicPr>
+                      <p:cNvPr id="0" name=""/>
+                      <p:cNvPicPr/>
+                      <p:nvPr/>
+                    </p:nvPicPr>
+                    <p:blipFill>
+                      <a:blip r:embed="rId4"/>
+                      <a:stretch>
+                        <a:fillRect/>
+                      </a:stretch>
+                    </p:blipFill>
+                    <p:spPr>
+                      <a:xfrm>
+                        <a:off x="534804" y="1936865"/>
+                        <a:ext cx="11302283" cy="2909455"/>
+                      </a:xfrm>
+                      <a:prstGeom prst="rect">
+                        <a:avLst/>
+                      </a:prstGeom>
+                    </p:spPr>
+                  </p:pic>
+                </p:oleObj>
+              </mc:Fallback>
+            </mc:AlternateContent>
+          </a:graphicData>
+        </a:graphic>
+      </p:graphicFrame>
+    </p:spTree>
+    <p:extLst>
+      <p:ext uri="{BB962C8B-B14F-4D97-AF65-F5344CB8AC3E}">
+        <p14:creationId xmlns:p14="http://schemas.microsoft.com/office/powerpoint/2010/main" val="3505502397"/>
+      </p:ext>
+    </p:extLst>
+  </p:cSld>
+  <p:clrMapOvr>
+    <a:masterClrMapping/>
+  </p:clrMapOvr>
+  <p:timing>
+    <p:tnLst>
+      <p:par>
+        <p:cTn id="1" dur="indefinite" restart="never" nodeType="tmRoot"/>
+      </p:par>
+    </p:tnLst>
+  </p:timing>
+</p:sld>
+</file>
+
+<file path=ppt/slides/slide15.xml><?xml version="1.0" encoding="utf-8"?>
+<p:sld xmlns:a="http://schemas.openxmlformats.org/drawingml/2006/main" xmlns:r="http://schemas.openxmlformats.org/officeDocument/2006/relationships" xmlns:p="http://schemas.openxmlformats.org/presentationml/2006/main">
+  <p:cSld>
+    <p:spTree>
+      <p:nvGrpSpPr>
+        <p:cNvPr id="1" name=""/>
+        <p:cNvGrpSpPr/>
+        <p:nvPr/>
+      </p:nvGrpSpPr>
+      <p:grpSpPr>
+        <a:xfrm>
+          <a:off x="0" y="0"/>
+          <a:ext cx="0" cy="0"/>
+          <a:chOff x="0" y="0"/>
+          <a:chExt cx="0" cy="0"/>
+        </a:xfrm>
+      </p:grpSpPr>
+      <p:sp>
+        <p:nvSpPr>
           <p:cNvPr id="4" name="Title 3"/>
           <p:cNvSpPr>
             <a:spLocks noGrp="1"/>
@@ -11877,11 +12053,7 @@
           <a:p>
             <a:r>
               <a:rPr lang="en-US" sz="5600" dirty="0" smtClean="0"/>
-              <a:t>Lessons </a:t>
-            </a:r>
-            <a:r>
-              <a:rPr lang="en-US" sz="5600" dirty="0" smtClean="0"/>
-              <a:t>learned</a:t>
+              <a:t>Lessons learned</a:t>
             </a:r>
             <a:endParaRPr lang="en-US" sz="5600" dirty="0"/>
           </a:p>
@@ -11925,11 +12097,7 @@
             </a:pPr>
             <a:r>
               <a:rPr lang="en-US" sz="3200" dirty="0" smtClean="0"/>
-              <a:t>Be careful with discount power </a:t>
-            </a:r>
-            <a:r>
-              <a:rPr lang="en-US" sz="3200" dirty="0" smtClean="0"/>
-              <a:t>supplies</a:t>
+              <a:t>Be careful with discount power supplies</a:t>
             </a:r>
           </a:p>
           <a:p>
@@ -11961,7 +12129,6 @@
               <a:rPr lang="en-US" sz="3200" dirty="0" smtClean="0"/>
               <a:t>Can have greater spacing between traces (it’s okay)</a:t>
             </a:r>
-            <a:endParaRPr lang="en-US" sz="3200" dirty="0" smtClean="0"/>
           </a:p>
           <a:p>
             <a:pPr marL="342900" indent="-342900">
@@ -12046,7 +12213,7 @@
 </p:sld>
 </file>
 
-<file path=ppt/slides/slide15.xml><?xml version="1.0" encoding="utf-8"?>
+<file path=ppt/slides/slide16.xml><?xml version="1.0" encoding="utf-8"?>
 <p:sld xmlns:a="http://schemas.openxmlformats.org/drawingml/2006/main" xmlns:r="http://schemas.openxmlformats.org/officeDocument/2006/relationships" xmlns:p="http://schemas.openxmlformats.org/presentationml/2006/main">
   <p:cSld>
     <p:spTree>
@@ -13673,11 +13840,7 @@
             </a:pPr>
             <a:r>
               <a:rPr lang="en-US" sz="4000" dirty="0" smtClean="0"/>
-              <a:t>Self watering plant </a:t>
-            </a:r>
-            <a:r>
-              <a:rPr lang="en-US" sz="4000" dirty="0" smtClean="0"/>
-              <a:t>system</a:t>
+              <a:t>Self watering plant system</a:t>
             </a:r>
           </a:p>
           <a:p>
@@ -13689,7 +13852,6 @@
               <a:rPr lang="en-US" sz="4000" dirty="0" smtClean="0"/>
               <a:t>Periodically checks moisture level</a:t>
             </a:r>
-            <a:endParaRPr lang="en-US" sz="4000" dirty="0" smtClean="0"/>
           </a:p>
           <a:p>
             <a:pPr marL="800100" lvl="1" indent="-342900">
@@ -13698,13 +13860,8 @@
             </a:pPr>
             <a:r>
               <a:rPr lang="en-US" sz="4000" dirty="0" smtClean="0"/>
-              <a:t>Turns </a:t>
-            </a:r>
-            <a:r>
-              <a:rPr lang="en-US" sz="4000" dirty="0" smtClean="0"/>
-              <a:t>on when moisture level out of bounds</a:t>
-            </a:r>
-            <a:endParaRPr lang="en-US" sz="4000" dirty="0" smtClean="0"/>
+              <a:t>Turns on when moisture level out of bounds</a:t>
+            </a:r>
           </a:p>
           <a:p>
             <a:pPr marL="800100" lvl="1" indent="-342900">
@@ -13713,17 +13870,8 @@
             </a:pPr>
             <a:r>
               <a:rPr lang="en-US" sz="4000" dirty="0" smtClean="0"/>
-              <a:t>Waters </a:t>
-            </a:r>
-            <a:r>
-              <a:rPr lang="en-US" sz="4000" dirty="0" smtClean="0"/>
-              <a:t>appropriate </a:t>
-            </a:r>
-            <a:r>
-              <a:rPr lang="en-US" sz="4000" dirty="0" smtClean="0"/>
-              <a:t>amount</a:t>
-            </a:r>
-            <a:endParaRPr lang="en-US" sz="4000" dirty="0" smtClean="0"/>
+              <a:t>Waters appropriate amount</a:t>
+            </a:r>
           </a:p>
         </p:txBody>
       </p:sp>
@@ -14268,11 +14416,7 @@
             </a:r>
             <a:r>
               <a:rPr lang="en-US" sz="2800" dirty="0" smtClean="0"/>
-              <a:t> </a:t>
-            </a:r>
-            <a:r>
-              <a:rPr lang="en-US" sz="2800" dirty="0" smtClean="0"/>
-              <a:t>of hardware via </a:t>
+              <a:t> of hardware via </a:t>
             </a:r>
             <a:r>
               <a:rPr lang="en-US" sz="2800" dirty="0" err="1" smtClean="0"/>

</xml_diff>